<commit_message>
SChema and Attribute for DB design added
</commit_message>
<xml_diff>
--- a/ISD_Management_of_Judicial_System_DatabaseDesign.pptx
+++ b/ISD_Management_of_Judicial_System_DatabaseDesign.pptx
@@ -2,7 +2,7 @@
 <file path=ppt/presentation.xml><?xml version="1.0" encoding="utf-8"?>
 <p:presentation xmlns:a="http://schemas.openxmlformats.org/drawingml/2006/main" xmlns:r="http://schemas.openxmlformats.org/officeDocument/2006/relationships" xmlns:p="http://schemas.openxmlformats.org/presentationml/2006/main" saveSubsetFonts="1">
   <p:sldMasterIdLst>
-    <p:sldMasterId id="2147483648" r:id="rId1"/>
+    <p:sldMasterId id="2147483672" r:id="rId1"/>
   </p:sldMasterIdLst>
   <p:notesMasterIdLst>
     <p:notesMasterId r:id="rId6"/>
@@ -1608,8 +1608,8 @@
   <dgm:cxnLst>
     <dgm:cxn modelId="{6A40C63C-8961-4EBA-9255-13AD456859B5}" type="presOf" srcId="{2C0ADF64-AA54-4716-99AB-B5522FC3EE7F}" destId="{83435198-56C5-4121-8012-E946B19C1494}" srcOrd="0" destOrd="0" presId="urn:microsoft.com/office/officeart/2005/8/layout/vList5"/>
     <dgm:cxn modelId="{FCB832E7-E5BF-41D8-B48C-15AB76DD3FD9}" type="presOf" srcId="{5ADB7CA6-5887-459F-879A-19038229DD54}" destId="{15FA724B-FE1E-4ACE-9404-01F575B70E32}" srcOrd="0" destOrd="0" presId="urn:microsoft.com/office/officeart/2005/8/layout/vList5"/>
+    <dgm:cxn modelId="{5D2CFE23-B655-437F-8654-4090B6497ABF}" type="presOf" srcId="{76A4D70C-F319-4BDC-BCF9-41AF8B5EA78C}" destId="{B3E6B7DD-E5B9-4520-9CF0-9412C478314E}" srcOrd="0" destOrd="0" presId="urn:microsoft.com/office/officeart/2005/8/layout/vList5"/>
     <dgm:cxn modelId="{491E8A8C-2BDC-4AB6-B814-10C19E3D3F1E}" type="presOf" srcId="{8295D529-82E3-4F85-8D30-123043AB8579}" destId="{9B19824A-0CD6-4763-8827-043705CA5DB9}" srcOrd="0" destOrd="0" presId="urn:microsoft.com/office/officeart/2005/8/layout/vList5"/>
-    <dgm:cxn modelId="{5D2CFE23-B655-437F-8654-4090B6497ABF}" type="presOf" srcId="{76A4D70C-F319-4BDC-BCF9-41AF8B5EA78C}" destId="{B3E6B7DD-E5B9-4520-9CF0-9412C478314E}" srcOrd="0" destOrd="0" presId="urn:microsoft.com/office/officeart/2005/8/layout/vList5"/>
     <dgm:cxn modelId="{148CC7A8-7DE8-48AB-9FA9-3B78C5B1A43F}" srcId="{1F860C62-3AFA-486E-A846-9662B091B87C}" destId="{812C1D57-048C-49C8-A1ED-67B2C6964FA2}" srcOrd="0" destOrd="0" parTransId="{A415C863-DA8B-433C-BBEC-A69671BB2442}" sibTransId="{D0D7B122-B2C4-4270-BF15-57495C121E8D}"/>
     <dgm:cxn modelId="{8797BD8A-9BEF-4F05-A2B0-23DF1EC8A6AC}" srcId="{BF746235-D33C-44B5-B274-A7F4D2143A54}" destId="{F6A1390F-42B9-44DC-8047-CE54CF94AF2E}" srcOrd="0" destOrd="0" parTransId="{D2CE8FBD-92C9-4B58-8300-C3DE361F9E67}" sibTransId="{1065A70C-0FAC-402B-B366-249E3C571607}"/>
     <dgm:cxn modelId="{3ED7B479-A345-4079-A74F-F45602BE0AA4}" srcId="{76A4D70C-F319-4BDC-BCF9-41AF8B5EA78C}" destId="{8295D529-82E3-4F85-8D30-123043AB8579}" srcOrd="1" destOrd="0" parTransId="{09367ADD-ADB7-49A0-A804-BECAF1AE2B6C}" sibTransId="{5F7E8458-177D-47DF-93F9-A191E5EC6EB9}"/>
@@ -1682,38 +1682,29 @@
           <a:gsLst>
             <a:gs pos="0">
               <a:schemeClr val="accent3">
-                <a:shade val="51000"/>
-                <a:satMod val="130000"/>
-              </a:schemeClr>
-            </a:gs>
-            <a:gs pos="80000">
-              <a:schemeClr val="accent3">
-                <a:shade val="93000"/>
-                <a:satMod val="130000"/>
+                <a:lumMod val="95000"/>
               </a:schemeClr>
             </a:gs>
             <a:gs pos="100000">
               <a:schemeClr val="accent3">
-                <a:shade val="94000"/>
-                <a:satMod val="135000"/>
+                <a:shade val="82000"/>
+                <a:satMod val="125000"/>
+                <a:lumMod val="74000"/>
               </a:schemeClr>
             </a:gs>
           </a:gsLst>
-          <a:lin ang="16200000" scaled="0"/>
+          <a:lin ang="5400000" scaled="0"/>
         </a:gradFill>
         <a:ln w="9525" cap="flat" cmpd="sng" algn="ctr">
           <a:solidFill>
-            <a:schemeClr val="accent3">
-              <a:shade val="95000"/>
-              <a:satMod val="105000"/>
-            </a:schemeClr>
+            <a:schemeClr val="accent3"/>
           </a:solidFill>
           <a:prstDash val="solid"/>
         </a:ln>
         <a:effectLst>
-          <a:outerShdw blurRad="40000" dist="23000" dir="5400000" rotWithShape="0">
+          <a:outerShdw blurRad="40005" dist="22984" dir="5400000" rotWithShape="0">
             <a:srgbClr val="000000">
-              <a:alpha val="35000"/>
+              <a:alpha val="45000"/>
             </a:srgbClr>
           </a:outerShdw>
         </a:effectLst>
@@ -1721,7 +1712,9 @@
           <a:camera prst="orthographicFront"/>
           <a:lightRig rig="chilly" dir="t"/>
         </a:scene3d>
-        <a:sp3d extrusionH="1700"/>
+        <a:sp3d extrusionH="1700" prstMaterial="matte">
+          <a:bevelT w="19050" h="38100"/>
+        </a:sp3d>
       </dsp:spPr>
       <dsp:style>
         <a:lnRef idx="1">
@@ -1738,12 +1731,12 @@
         </a:fontRef>
       </dsp:style>
       <dsp:txBody>
-        <a:bodyPr spcFirstLastPara="0" vert="horz" wrap="square" lIns="144780" tIns="72390" rIns="144780" bIns="72390" numCol="1" spcCol="1270" anchor="ctr" anchorCtr="0">
+        <a:bodyPr spcFirstLastPara="0" vert="horz" wrap="square" lIns="137160" tIns="68580" rIns="137160" bIns="68580" numCol="1" spcCol="1270" anchor="ctr" anchorCtr="0">
           <a:noAutofit/>
         </a:bodyPr>
         <a:lstStyle/>
         <a:p>
-          <a:pPr marL="285750" lvl="1" indent="-285750" algn="l" defTabSz="1689100">
+          <a:pPr marL="285750" lvl="1" indent="-285750" algn="l" defTabSz="1600200">
             <a:lnSpc>
               <a:spcPct val="90000"/>
             </a:lnSpc>
@@ -1756,10 +1749,10 @@
             <a:buChar char="••"/>
           </a:pPr>
           <a:r>
-            <a:rPr lang="en-US" sz="3800" kern="1200" dirty="0" smtClean="0"/>
+            <a:rPr lang="en-US" sz="3600" kern="1200" dirty="0" smtClean="0"/>
             <a:t>Case Filing</a:t>
           </a:r>
-          <a:endParaRPr lang="en-US" sz="3800" kern="1200" dirty="0"/>
+          <a:endParaRPr lang="en-US" sz="3600" kern="1200" dirty="0"/>
         </a:p>
       </dsp:txBody>
       <dsp:txXfrm rot="-5400000">
@@ -1784,41 +1777,37 @@
           <a:gsLst>
             <a:gs pos="0">
               <a:schemeClr val="accent6">
-                <a:shade val="51000"/>
-                <a:satMod val="130000"/>
-              </a:schemeClr>
-            </a:gs>
-            <a:gs pos="80000">
-              <a:schemeClr val="accent6">
-                <a:shade val="93000"/>
-                <a:satMod val="130000"/>
+                <a:lumMod val="95000"/>
               </a:schemeClr>
             </a:gs>
             <a:gs pos="100000">
               <a:schemeClr val="accent6">
-                <a:shade val="94000"/>
-                <a:satMod val="135000"/>
+                <a:shade val="82000"/>
+                <a:satMod val="125000"/>
+                <a:lumMod val="74000"/>
               </a:schemeClr>
             </a:gs>
           </a:gsLst>
-          <a:lin ang="16200000" scaled="0"/>
+          <a:lin ang="5400000" scaled="0"/>
         </a:gradFill>
         <a:ln>
           <a:noFill/>
         </a:ln>
         <a:effectLst>
-          <a:outerShdw blurRad="40000" dist="23000" dir="5400000" rotWithShape="0">
-            <a:srgbClr val="000000">
-              <a:alpha val="35000"/>
-            </a:srgbClr>
-          </a:outerShdw>
+          <a:reflection blurRad="38100" stA="26000" endPos="23000" dist="25400" dir="5400000" sy="-100000" rotWithShape="0"/>
         </a:effectLst>
         <a:scene3d>
           <a:camera prst="orthographicFront"/>
           <a:lightRig rig="chilly" dir="t"/>
         </a:scene3d>
-        <a:sp3d>
-          <a:bevelT w="63500" h="25400"/>
+        <a:sp3d contourW="14605" prstMaterial="plastic">
+          <a:bevelT w="50800"/>
+          <a:contourClr>
+            <a:schemeClr val="accent6">
+              <a:shade val="30000"/>
+              <a:satMod val="120000"/>
+            </a:schemeClr>
+          </a:contourClr>
         </a:sp3d>
       </dsp:spPr>
       <dsp:style>
@@ -1836,12 +1825,12 @@
         </a:fontRef>
       </dsp:style>
       <dsp:txBody>
-        <a:bodyPr spcFirstLastPara="0" vert="horz" wrap="square" lIns="110490" tIns="55245" rIns="110490" bIns="55245" numCol="1" spcCol="1270" anchor="ctr" anchorCtr="0">
+        <a:bodyPr spcFirstLastPara="0" vert="horz" wrap="square" lIns="106680" tIns="53340" rIns="106680" bIns="53340" numCol="1" spcCol="1270" anchor="ctr" anchorCtr="0">
           <a:noAutofit/>
         </a:bodyPr>
         <a:lstStyle/>
         <a:p>
-          <a:pPr lvl="0" algn="ctr" defTabSz="1289050" rtl="0">
+          <a:pPr lvl="0" algn="ctr" defTabSz="1244600" rtl="0">
             <a:lnSpc>
               <a:spcPct val="90000"/>
             </a:lnSpc>
@@ -1853,10 +1842,10 @@
             </a:spcAft>
           </a:pPr>
           <a:r>
-            <a:rPr lang="en-US" sz="2900" kern="1200" dirty="0" smtClean="0"/>
+            <a:rPr lang="en-US" sz="2800" kern="1200" dirty="0" smtClean="0"/>
             <a:t>Police Station</a:t>
           </a:r>
-          <a:endParaRPr lang="en-US" sz="2900" kern="1200" dirty="0"/>
+          <a:endParaRPr lang="en-US" sz="2800" kern="1200" dirty="0"/>
         </a:p>
       </dsp:txBody>
       <dsp:txXfrm>
@@ -1881,38 +1870,29 @@
           <a:gsLst>
             <a:gs pos="0">
               <a:schemeClr val="accent3">
-                <a:shade val="51000"/>
-                <a:satMod val="130000"/>
-              </a:schemeClr>
-            </a:gs>
-            <a:gs pos="80000">
-              <a:schemeClr val="accent3">
-                <a:shade val="93000"/>
-                <a:satMod val="130000"/>
+                <a:lumMod val="95000"/>
               </a:schemeClr>
             </a:gs>
             <a:gs pos="100000">
               <a:schemeClr val="accent3">
-                <a:shade val="94000"/>
-                <a:satMod val="135000"/>
+                <a:shade val="82000"/>
+                <a:satMod val="125000"/>
+                <a:lumMod val="74000"/>
               </a:schemeClr>
             </a:gs>
           </a:gsLst>
-          <a:lin ang="16200000" scaled="0"/>
+          <a:lin ang="5400000" scaled="0"/>
         </a:gradFill>
         <a:ln w="9525" cap="flat" cmpd="sng" algn="ctr">
           <a:solidFill>
-            <a:schemeClr val="accent3">
-              <a:shade val="95000"/>
-              <a:satMod val="105000"/>
-            </a:schemeClr>
+            <a:schemeClr val="accent3"/>
           </a:solidFill>
           <a:prstDash val="solid"/>
         </a:ln>
         <a:effectLst>
-          <a:outerShdw blurRad="40000" dist="23000" dir="5400000" rotWithShape="0">
+          <a:outerShdw blurRad="40005" dist="22984" dir="5400000" rotWithShape="0">
             <a:srgbClr val="000000">
-              <a:alpha val="35000"/>
+              <a:alpha val="45000"/>
             </a:srgbClr>
           </a:outerShdw>
         </a:effectLst>
@@ -1920,7 +1900,9 @@
           <a:camera prst="orthographicFront"/>
           <a:lightRig rig="chilly" dir="t"/>
         </a:scene3d>
-        <a:sp3d extrusionH="1700"/>
+        <a:sp3d extrusionH="1700" prstMaterial="matte">
+          <a:bevelT w="19050" h="38100"/>
+        </a:sp3d>
       </dsp:spPr>
       <dsp:style>
         <a:lnRef idx="1">
@@ -1937,12 +1919,12 @@
         </a:fontRef>
       </dsp:style>
       <dsp:txBody>
-        <a:bodyPr spcFirstLastPara="0" vert="horz" wrap="square" lIns="144780" tIns="72390" rIns="144780" bIns="72390" numCol="1" spcCol="1270" anchor="ctr" anchorCtr="0">
+        <a:bodyPr spcFirstLastPara="0" vert="horz" wrap="square" lIns="137160" tIns="68580" rIns="137160" bIns="68580" numCol="1" spcCol="1270" anchor="ctr" anchorCtr="0">
           <a:noAutofit/>
         </a:bodyPr>
         <a:lstStyle/>
         <a:p>
-          <a:pPr marL="285750" lvl="1" indent="-285750" algn="l" defTabSz="1689100">
+          <a:pPr marL="285750" lvl="1" indent="-285750" algn="l" defTabSz="1600200">
             <a:lnSpc>
               <a:spcPct val="90000"/>
             </a:lnSpc>
@@ -1955,10 +1937,10 @@
             <a:buChar char="••"/>
           </a:pPr>
           <a:r>
-            <a:rPr lang="en-US" sz="3800" kern="1200" dirty="0" smtClean="0"/>
+            <a:rPr lang="en-US" sz="3600" kern="1200" dirty="0" smtClean="0"/>
             <a:t>Cause List Generation</a:t>
           </a:r>
-          <a:endParaRPr lang="en-US" sz="3800" kern="1200" dirty="0"/>
+          <a:endParaRPr lang="en-US" sz="3600" kern="1200" dirty="0"/>
         </a:p>
       </dsp:txBody>
       <dsp:txXfrm rot="-5400000">
@@ -1983,41 +1965,37 @@
           <a:gsLst>
             <a:gs pos="0">
               <a:schemeClr val="accent6">
-                <a:shade val="51000"/>
-                <a:satMod val="130000"/>
-              </a:schemeClr>
-            </a:gs>
-            <a:gs pos="80000">
-              <a:schemeClr val="accent6">
-                <a:shade val="93000"/>
-                <a:satMod val="130000"/>
+                <a:lumMod val="95000"/>
               </a:schemeClr>
             </a:gs>
             <a:gs pos="100000">
               <a:schemeClr val="accent6">
-                <a:shade val="94000"/>
-                <a:satMod val="135000"/>
+                <a:shade val="82000"/>
+                <a:satMod val="125000"/>
+                <a:lumMod val="74000"/>
               </a:schemeClr>
             </a:gs>
           </a:gsLst>
-          <a:lin ang="16200000" scaled="0"/>
+          <a:lin ang="5400000" scaled="0"/>
         </a:gradFill>
         <a:ln>
           <a:noFill/>
         </a:ln>
         <a:effectLst>
-          <a:outerShdw blurRad="40000" dist="23000" dir="5400000" rotWithShape="0">
-            <a:srgbClr val="000000">
-              <a:alpha val="35000"/>
-            </a:srgbClr>
-          </a:outerShdw>
+          <a:reflection blurRad="38100" stA="26000" endPos="23000" dist="25400" dir="5400000" sy="-100000" rotWithShape="0"/>
         </a:effectLst>
         <a:scene3d>
           <a:camera prst="orthographicFront"/>
           <a:lightRig rig="chilly" dir="t"/>
         </a:scene3d>
-        <a:sp3d>
-          <a:bevelT w="63500" h="25400"/>
+        <a:sp3d contourW="14605" prstMaterial="plastic">
+          <a:bevelT w="50800"/>
+          <a:contourClr>
+            <a:schemeClr val="accent6">
+              <a:shade val="30000"/>
+              <a:satMod val="120000"/>
+            </a:schemeClr>
+          </a:contourClr>
         </a:sp3d>
       </dsp:spPr>
       <dsp:style>
@@ -2035,12 +2013,12 @@
         </a:fontRef>
       </dsp:style>
       <dsp:txBody>
-        <a:bodyPr spcFirstLastPara="0" vert="horz" wrap="square" lIns="110490" tIns="55245" rIns="110490" bIns="55245" numCol="1" spcCol="1270" anchor="ctr" anchorCtr="0">
+        <a:bodyPr spcFirstLastPara="0" vert="horz" wrap="square" lIns="106680" tIns="53340" rIns="106680" bIns="53340" numCol="1" spcCol="1270" anchor="ctr" anchorCtr="0">
           <a:noAutofit/>
         </a:bodyPr>
         <a:lstStyle/>
         <a:p>
-          <a:pPr lvl="0" algn="ctr" defTabSz="1289050" rtl="0">
+          <a:pPr lvl="0" algn="ctr" defTabSz="1244600" rtl="0">
             <a:lnSpc>
               <a:spcPct val="90000"/>
             </a:lnSpc>
@@ -2052,10 +2030,10 @@
             </a:spcAft>
           </a:pPr>
           <a:r>
-            <a:rPr lang="en-US" sz="2900" kern="1200" dirty="0" smtClean="0"/>
+            <a:rPr lang="en-US" sz="2800" kern="1200" dirty="0" smtClean="0"/>
             <a:t>Magistrate Office</a:t>
           </a:r>
-          <a:endParaRPr lang="en-US" sz="2900" kern="1200" dirty="0"/>
+          <a:endParaRPr lang="en-US" sz="2800" kern="1200" dirty="0"/>
         </a:p>
       </dsp:txBody>
       <dsp:txXfrm>
@@ -2080,38 +2058,29 @@
           <a:gsLst>
             <a:gs pos="0">
               <a:schemeClr val="accent3">
-                <a:shade val="51000"/>
-                <a:satMod val="130000"/>
-              </a:schemeClr>
-            </a:gs>
-            <a:gs pos="80000">
-              <a:schemeClr val="accent3">
-                <a:shade val="93000"/>
-                <a:satMod val="130000"/>
+                <a:lumMod val="95000"/>
               </a:schemeClr>
             </a:gs>
             <a:gs pos="100000">
               <a:schemeClr val="accent3">
-                <a:shade val="94000"/>
-                <a:satMod val="135000"/>
+                <a:shade val="82000"/>
+                <a:satMod val="125000"/>
+                <a:lumMod val="74000"/>
               </a:schemeClr>
             </a:gs>
           </a:gsLst>
-          <a:lin ang="16200000" scaled="0"/>
+          <a:lin ang="5400000" scaled="0"/>
         </a:gradFill>
         <a:ln w="9525" cap="flat" cmpd="sng" algn="ctr">
           <a:solidFill>
-            <a:schemeClr val="accent3">
-              <a:shade val="95000"/>
-              <a:satMod val="105000"/>
-            </a:schemeClr>
+            <a:schemeClr val="accent3"/>
           </a:solidFill>
           <a:prstDash val="solid"/>
         </a:ln>
         <a:effectLst>
-          <a:outerShdw blurRad="40000" dist="23000" dir="5400000" rotWithShape="0">
+          <a:outerShdw blurRad="40005" dist="22984" dir="5400000" rotWithShape="0">
             <a:srgbClr val="000000">
-              <a:alpha val="35000"/>
+              <a:alpha val="45000"/>
             </a:srgbClr>
           </a:outerShdw>
         </a:effectLst>
@@ -2119,7 +2088,9 @@
           <a:camera prst="orthographicFront"/>
           <a:lightRig rig="chilly" dir="t"/>
         </a:scene3d>
-        <a:sp3d extrusionH="1700"/>
+        <a:sp3d extrusionH="1700" prstMaterial="matte">
+          <a:bevelT w="19050" h="38100"/>
+        </a:sp3d>
       </dsp:spPr>
       <dsp:style>
         <a:lnRef idx="1">
@@ -2136,12 +2107,12 @@
         </a:fontRef>
       </dsp:style>
       <dsp:txBody>
-        <a:bodyPr spcFirstLastPara="0" vert="horz" wrap="square" lIns="144780" tIns="72390" rIns="144780" bIns="72390" numCol="1" spcCol="1270" anchor="ctr" anchorCtr="0">
+        <a:bodyPr spcFirstLastPara="0" vert="horz" wrap="square" lIns="137160" tIns="68580" rIns="137160" bIns="68580" numCol="1" spcCol="1270" anchor="ctr" anchorCtr="0">
           <a:noAutofit/>
         </a:bodyPr>
         <a:lstStyle/>
         <a:p>
-          <a:pPr marL="285750" lvl="1" indent="-285750" algn="l" defTabSz="1689100">
+          <a:pPr marL="285750" lvl="1" indent="-285750" algn="l" defTabSz="1600200">
             <a:lnSpc>
               <a:spcPct val="90000"/>
             </a:lnSpc>
@@ -2154,10 +2125,10 @@
             <a:buChar char="••"/>
           </a:pPr>
           <a:r>
-            <a:rPr lang="en-US" sz="3800" kern="1200" dirty="0" smtClean="0"/>
+            <a:rPr lang="en-US" sz="3600" kern="1200" dirty="0" smtClean="0"/>
             <a:t>Magistrate Assignment</a:t>
           </a:r>
-          <a:endParaRPr lang="en-US" sz="3800" kern="1200" dirty="0"/>
+          <a:endParaRPr lang="en-US" sz="3600" kern="1200" dirty="0"/>
         </a:p>
       </dsp:txBody>
       <dsp:txXfrm rot="-5400000">
@@ -2182,41 +2153,37 @@
           <a:gsLst>
             <a:gs pos="0">
               <a:schemeClr val="accent6">
-                <a:shade val="51000"/>
-                <a:satMod val="130000"/>
-              </a:schemeClr>
-            </a:gs>
-            <a:gs pos="80000">
-              <a:schemeClr val="accent6">
-                <a:shade val="93000"/>
-                <a:satMod val="130000"/>
+                <a:lumMod val="95000"/>
               </a:schemeClr>
             </a:gs>
             <a:gs pos="100000">
               <a:schemeClr val="accent6">
-                <a:shade val="94000"/>
-                <a:satMod val="135000"/>
+                <a:shade val="82000"/>
+                <a:satMod val="125000"/>
+                <a:lumMod val="74000"/>
               </a:schemeClr>
             </a:gs>
           </a:gsLst>
-          <a:lin ang="16200000" scaled="0"/>
+          <a:lin ang="5400000" scaled="0"/>
         </a:gradFill>
         <a:ln>
           <a:noFill/>
         </a:ln>
         <a:effectLst>
-          <a:outerShdw blurRad="40000" dist="23000" dir="5400000" rotWithShape="0">
-            <a:srgbClr val="000000">
-              <a:alpha val="35000"/>
-            </a:srgbClr>
-          </a:outerShdw>
+          <a:reflection blurRad="38100" stA="26000" endPos="23000" dist="25400" dir="5400000" sy="-100000" rotWithShape="0"/>
         </a:effectLst>
         <a:scene3d>
           <a:camera prst="orthographicFront"/>
           <a:lightRig rig="chilly" dir="t"/>
         </a:scene3d>
-        <a:sp3d>
-          <a:bevelT w="63500" h="25400"/>
+        <a:sp3d contourW="14605" prstMaterial="plastic">
+          <a:bevelT w="50800"/>
+          <a:contourClr>
+            <a:schemeClr val="accent6">
+              <a:shade val="30000"/>
+              <a:satMod val="120000"/>
+            </a:schemeClr>
+          </a:contourClr>
         </a:sp3d>
       </dsp:spPr>
       <dsp:style>
@@ -2234,12 +2201,12 @@
         </a:fontRef>
       </dsp:style>
       <dsp:txBody>
-        <a:bodyPr spcFirstLastPara="0" vert="horz" wrap="square" lIns="110490" tIns="55245" rIns="110490" bIns="55245" numCol="1" spcCol="1270" anchor="ctr" anchorCtr="0">
+        <a:bodyPr spcFirstLastPara="0" vert="horz" wrap="square" lIns="106680" tIns="53340" rIns="106680" bIns="53340" numCol="1" spcCol="1270" anchor="ctr" anchorCtr="0">
           <a:noAutofit/>
         </a:bodyPr>
         <a:lstStyle/>
         <a:p>
-          <a:pPr lvl="0" algn="ctr" defTabSz="1289050">
+          <a:pPr lvl="0" algn="ctr" defTabSz="1244600">
             <a:lnSpc>
               <a:spcPct val="90000"/>
             </a:lnSpc>
@@ -2251,10 +2218,10 @@
             </a:spcAft>
           </a:pPr>
           <a:r>
-            <a:rPr lang="en-US" sz="2900" kern="1200" dirty="0" smtClean="0"/>
+            <a:rPr lang="en-US" sz="2800" kern="1200" dirty="0" smtClean="0"/>
             <a:t>CMM Court</a:t>
           </a:r>
-          <a:endParaRPr lang="en-US" sz="2900" kern="1200" dirty="0"/>
+          <a:endParaRPr lang="en-US" sz="2800" kern="1200" dirty="0"/>
         </a:p>
       </dsp:txBody>
       <dsp:txXfrm>
@@ -2279,38 +2246,29 @@
           <a:gsLst>
             <a:gs pos="0">
               <a:schemeClr val="accent3">
-                <a:shade val="51000"/>
-                <a:satMod val="130000"/>
-              </a:schemeClr>
-            </a:gs>
-            <a:gs pos="80000">
-              <a:schemeClr val="accent3">
-                <a:shade val="93000"/>
-                <a:satMod val="130000"/>
+                <a:lumMod val="95000"/>
               </a:schemeClr>
             </a:gs>
             <a:gs pos="100000">
               <a:schemeClr val="accent3">
-                <a:shade val="94000"/>
-                <a:satMod val="135000"/>
+                <a:shade val="82000"/>
+                <a:satMod val="125000"/>
+                <a:lumMod val="74000"/>
               </a:schemeClr>
             </a:gs>
           </a:gsLst>
-          <a:lin ang="16200000" scaled="0"/>
+          <a:lin ang="5400000" scaled="0"/>
         </a:gradFill>
         <a:ln w="9525" cap="flat" cmpd="sng" algn="ctr">
           <a:solidFill>
-            <a:schemeClr val="accent3">
-              <a:shade val="95000"/>
-              <a:satMod val="105000"/>
-            </a:schemeClr>
+            <a:schemeClr val="accent3"/>
           </a:solidFill>
           <a:prstDash val="solid"/>
         </a:ln>
         <a:effectLst>
-          <a:outerShdw blurRad="40000" dist="23000" dir="5400000" rotWithShape="0">
+          <a:outerShdw blurRad="40005" dist="22984" dir="5400000" rotWithShape="0">
             <a:srgbClr val="000000">
-              <a:alpha val="35000"/>
+              <a:alpha val="45000"/>
             </a:srgbClr>
           </a:outerShdw>
         </a:effectLst>
@@ -2318,7 +2276,9 @@
           <a:camera prst="orthographicFront"/>
           <a:lightRig rig="chilly" dir="t"/>
         </a:scene3d>
-        <a:sp3d extrusionH="1700"/>
+        <a:sp3d extrusionH="1700" prstMaterial="matte">
+          <a:bevelT w="19050" h="38100"/>
+        </a:sp3d>
       </dsp:spPr>
       <dsp:style>
         <a:lnRef idx="1">
@@ -2335,12 +2295,12 @@
         </a:fontRef>
       </dsp:style>
       <dsp:txBody>
-        <a:bodyPr spcFirstLastPara="0" vert="horz" wrap="square" lIns="144780" tIns="72390" rIns="144780" bIns="72390" numCol="1" spcCol="1270" anchor="ctr" anchorCtr="0">
+        <a:bodyPr spcFirstLastPara="0" vert="horz" wrap="square" lIns="137160" tIns="68580" rIns="137160" bIns="68580" numCol="1" spcCol="1270" anchor="ctr" anchorCtr="0">
           <a:noAutofit/>
         </a:bodyPr>
         <a:lstStyle/>
         <a:p>
-          <a:pPr marL="285750" lvl="1" indent="-285750" algn="l" defTabSz="1689100">
+          <a:pPr marL="285750" lvl="1" indent="-285750" algn="l" defTabSz="1600200">
             <a:lnSpc>
               <a:spcPct val="90000"/>
             </a:lnSpc>
@@ -2353,10 +2313,10 @@
             <a:buChar char="••"/>
           </a:pPr>
           <a:r>
-            <a:rPr lang="en-US" sz="3800" kern="1200" dirty="0" smtClean="0"/>
+            <a:rPr lang="en-US" sz="3600" kern="1200" dirty="0" smtClean="0"/>
             <a:t>Document Collection</a:t>
           </a:r>
-          <a:endParaRPr lang="en-US" sz="3800" kern="1200" dirty="0"/>
+          <a:endParaRPr lang="en-US" sz="3600" kern="1200" dirty="0"/>
         </a:p>
       </dsp:txBody>
       <dsp:txXfrm rot="-5400000">
@@ -2381,41 +2341,37 @@
           <a:gsLst>
             <a:gs pos="0">
               <a:schemeClr val="accent6">
-                <a:shade val="51000"/>
-                <a:satMod val="130000"/>
-              </a:schemeClr>
-            </a:gs>
-            <a:gs pos="80000">
-              <a:schemeClr val="accent6">
-                <a:shade val="93000"/>
-                <a:satMod val="130000"/>
+                <a:lumMod val="95000"/>
               </a:schemeClr>
             </a:gs>
             <a:gs pos="100000">
               <a:schemeClr val="accent6">
-                <a:shade val="94000"/>
-                <a:satMod val="135000"/>
+                <a:shade val="82000"/>
+                <a:satMod val="125000"/>
+                <a:lumMod val="74000"/>
               </a:schemeClr>
             </a:gs>
           </a:gsLst>
-          <a:lin ang="16200000" scaled="0"/>
+          <a:lin ang="5400000" scaled="0"/>
         </a:gradFill>
         <a:ln>
           <a:noFill/>
         </a:ln>
         <a:effectLst>
-          <a:outerShdw blurRad="40000" dist="23000" dir="5400000" rotWithShape="0">
-            <a:srgbClr val="000000">
-              <a:alpha val="35000"/>
-            </a:srgbClr>
-          </a:outerShdw>
+          <a:reflection blurRad="38100" stA="26000" endPos="23000" dist="25400" dir="5400000" sy="-100000" rotWithShape="0"/>
         </a:effectLst>
         <a:scene3d>
           <a:camera prst="orthographicFront"/>
           <a:lightRig rig="chilly" dir="t"/>
         </a:scene3d>
-        <a:sp3d>
-          <a:bevelT w="63500" h="25400"/>
+        <a:sp3d contourW="14605" prstMaterial="plastic">
+          <a:bevelT w="50800"/>
+          <a:contourClr>
+            <a:schemeClr val="accent6">
+              <a:shade val="30000"/>
+              <a:satMod val="120000"/>
+            </a:schemeClr>
+          </a:contourClr>
         </a:sp3d>
       </dsp:spPr>
       <dsp:style>
@@ -2433,12 +2389,12 @@
         </a:fontRef>
       </dsp:style>
       <dsp:txBody>
-        <a:bodyPr spcFirstLastPara="0" vert="horz" wrap="square" lIns="110490" tIns="55245" rIns="110490" bIns="55245" numCol="1" spcCol="1270" anchor="ctr" anchorCtr="0">
+        <a:bodyPr spcFirstLastPara="0" vert="horz" wrap="square" lIns="106680" tIns="53340" rIns="106680" bIns="53340" numCol="1" spcCol="1270" anchor="ctr" anchorCtr="0">
           <a:noAutofit/>
         </a:bodyPr>
         <a:lstStyle/>
         <a:p>
-          <a:pPr lvl="0" algn="ctr" defTabSz="1289050">
+          <a:pPr lvl="0" algn="ctr" defTabSz="1244600">
             <a:lnSpc>
               <a:spcPct val="90000"/>
             </a:lnSpc>
@@ -2450,10 +2406,10 @@
             </a:spcAft>
           </a:pPr>
           <a:r>
-            <a:rPr lang="en-US" sz="2900" kern="1200" dirty="0" smtClean="0"/>
+            <a:rPr lang="en-US" sz="2800" kern="1200" dirty="0" smtClean="0"/>
             <a:t>Copy House</a:t>
           </a:r>
-          <a:endParaRPr lang="en-US" sz="2900" kern="1200" dirty="0"/>
+          <a:endParaRPr lang="en-US" sz="2800" kern="1200" dirty="0"/>
         </a:p>
       </dsp:txBody>
       <dsp:txXfrm>
@@ -2478,38 +2434,29 @@
           <a:gsLst>
             <a:gs pos="0">
               <a:schemeClr val="accent3">
-                <a:shade val="51000"/>
-                <a:satMod val="130000"/>
-              </a:schemeClr>
-            </a:gs>
-            <a:gs pos="80000">
-              <a:schemeClr val="accent3">
-                <a:shade val="93000"/>
-                <a:satMod val="130000"/>
+                <a:lumMod val="95000"/>
               </a:schemeClr>
             </a:gs>
             <a:gs pos="100000">
               <a:schemeClr val="accent3">
-                <a:shade val="94000"/>
-                <a:satMod val="135000"/>
+                <a:shade val="82000"/>
+                <a:satMod val="125000"/>
+                <a:lumMod val="74000"/>
               </a:schemeClr>
             </a:gs>
           </a:gsLst>
-          <a:lin ang="16200000" scaled="0"/>
+          <a:lin ang="5400000" scaled="0"/>
         </a:gradFill>
         <a:ln w="9525" cap="flat" cmpd="sng" algn="ctr">
           <a:solidFill>
-            <a:schemeClr val="accent3">
-              <a:shade val="95000"/>
-              <a:satMod val="105000"/>
-            </a:schemeClr>
+            <a:schemeClr val="accent3"/>
           </a:solidFill>
           <a:prstDash val="solid"/>
         </a:ln>
         <a:effectLst>
-          <a:outerShdw blurRad="40000" dist="23000" dir="5400000" rotWithShape="0">
+          <a:outerShdw blurRad="40005" dist="22984" dir="5400000" rotWithShape="0">
             <a:srgbClr val="000000">
-              <a:alpha val="35000"/>
+              <a:alpha val="45000"/>
             </a:srgbClr>
           </a:outerShdw>
         </a:effectLst>
@@ -2517,7 +2464,9 @@
           <a:camera prst="orthographicFront"/>
           <a:lightRig rig="chilly" dir="t"/>
         </a:scene3d>
-        <a:sp3d extrusionH="1700"/>
+        <a:sp3d extrusionH="1700" prstMaterial="matte">
+          <a:bevelT w="19050" h="38100"/>
+        </a:sp3d>
       </dsp:spPr>
       <dsp:style>
         <a:lnRef idx="1">
@@ -2534,12 +2483,12 @@
         </a:fontRef>
       </dsp:style>
       <dsp:txBody>
-        <a:bodyPr spcFirstLastPara="0" vert="horz" wrap="square" lIns="144780" tIns="72390" rIns="144780" bIns="72390" numCol="1" spcCol="1270" anchor="ctr" anchorCtr="0">
+        <a:bodyPr spcFirstLastPara="0" vert="horz" wrap="square" lIns="137160" tIns="68580" rIns="137160" bIns="68580" numCol="1" spcCol="1270" anchor="ctr" anchorCtr="0">
           <a:noAutofit/>
         </a:bodyPr>
         <a:lstStyle/>
         <a:p>
-          <a:pPr marL="285750" lvl="1" indent="-285750" algn="l" defTabSz="1689100">
+          <a:pPr marL="285750" lvl="1" indent="-285750" algn="l" defTabSz="1600200">
             <a:lnSpc>
               <a:spcPct val="90000"/>
             </a:lnSpc>
@@ -2552,10 +2501,10 @@
             <a:buChar char="••"/>
           </a:pPr>
           <a:r>
-            <a:rPr lang="en-US" sz="3800" kern="1200" dirty="0" smtClean="0"/>
+            <a:rPr lang="en-US" sz="3600" kern="1200" dirty="0" smtClean="0"/>
             <a:t>Trial Documentation</a:t>
           </a:r>
-          <a:endParaRPr lang="en-US" sz="3800" kern="1200" dirty="0"/>
+          <a:endParaRPr lang="en-US" sz="3600" kern="1200" dirty="0"/>
         </a:p>
       </dsp:txBody>
       <dsp:txXfrm rot="-5400000">
@@ -2580,41 +2529,37 @@
           <a:gsLst>
             <a:gs pos="0">
               <a:schemeClr val="accent6">
-                <a:shade val="51000"/>
-                <a:satMod val="130000"/>
-              </a:schemeClr>
-            </a:gs>
-            <a:gs pos="80000">
-              <a:schemeClr val="accent6">
-                <a:shade val="93000"/>
-                <a:satMod val="130000"/>
+                <a:lumMod val="95000"/>
               </a:schemeClr>
             </a:gs>
             <a:gs pos="100000">
               <a:schemeClr val="accent6">
-                <a:shade val="94000"/>
-                <a:satMod val="135000"/>
+                <a:shade val="82000"/>
+                <a:satMod val="125000"/>
+                <a:lumMod val="74000"/>
               </a:schemeClr>
             </a:gs>
           </a:gsLst>
-          <a:lin ang="16200000" scaled="0"/>
+          <a:lin ang="5400000" scaled="0"/>
         </a:gradFill>
         <a:ln>
           <a:noFill/>
         </a:ln>
         <a:effectLst>
-          <a:outerShdw blurRad="40000" dist="23000" dir="5400000" rotWithShape="0">
-            <a:srgbClr val="000000">
-              <a:alpha val="35000"/>
-            </a:srgbClr>
-          </a:outerShdw>
+          <a:reflection blurRad="38100" stA="26000" endPos="23000" dist="25400" dir="5400000" sy="-100000" rotWithShape="0"/>
         </a:effectLst>
         <a:scene3d>
           <a:camera prst="orthographicFront"/>
           <a:lightRig rig="chilly" dir="t"/>
         </a:scene3d>
-        <a:sp3d>
-          <a:bevelT w="63500" h="25400"/>
+        <a:sp3d contourW="14605" prstMaterial="plastic">
+          <a:bevelT w="50800"/>
+          <a:contourClr>
+            <a:schemeClr val="accent6">
+              <a:shade val="30000"/>
+              <a:satMod val="120000"/>
+            </a:schemeClr>
+          </a:contourClr>
         </a:sp3d>
       </dsp:spPr>
       <dsp:style>
@@ -2632,12 +2577,12 @@
         </a:fontRef>
       </dsp:style>
       <dsp:txBody>
-        <a:bodyPr spcFirstLastPara="0" vert="horz" wrap="square" lIns="110490" tIns="55245" rIns="110490" bIns="55245" numCol="1" spcCol="1270" anchor="ctr" anchorCtr="0">
+        <a:bodyPr spcFirstLastPara="0" vert="horz" wrap="square" lIns="106680" tIns="53340" rIns="106680" bIns="53340" numCol="1" spcCol="1270" anchor="ctr" anchorCtr="0">
           <a:noAutofit/>
         </a:bodyPr>
         <a:lstStyle/>
         <a:p>
-          <a:pPr lvl="0" algn="ctr" defTabSz="1289050">
+          <a:pPr lvl="0" algn="ctr" defTabSz="1244600">
             <a:lnSpc>
               <a:spcPct val="90000"/>
             </a:lnSpc>
@@ -2649,10 +2594,10 @@
             </a:spcAft>
           </a:pPr>
           <a:r>
-            <a:rPr lang="en-US" sz="2900" kern="1200" dirty="0" smtClean="0"/>
+            <a:rPr lang="en-US" sz="2800" kern="1200" dirty="0" smtClean="0"/>
             <a:t>Trial Phase</a:t>
           </a:r>
-          <a:endParaRPr lang="en-US" sz="2900" kern="1200" dirty="0"/>
+          <a:endParaRPr lang="en-US" sz="2800" kern="1200" dirty="0"/>
         </a:p>
       </dsp:txBody>
       <dsp:txXfrm>
@@ -4443,7 +4388,7 @@
 </file>
 
 <file path=ppt/slideLayouts/slideLayout1.xml><?xml version="1.0" encoding="utf-8"?>
-<p:sldLayout xmlns:a="http://schemas.openxmlformats.org/drawingml/2006/main" xmlns:r="http://schemas.openxmlformats.org/officeDocument/2006/relationships" xmlns:p="http://schemas.openxmlformats.org/presentationml/2006/main" type="title" preserve="1">
+<p:sldLayout xmlns:a="http://schemas.openxmlformats.org/drawingml/2006/main" xmlns:r="http://schemas.openxmlformats.org/officeDocument/2006/relationships" xmlns:p="http://schemas.openxmlformats.org/presentationml/2006/main" showMasterSp="0" type="title" preserve="1">
   <p:cSld name="Title Slide">
     <p:spTree>
       <p:nvGrpSpPr>
@@ -4461,28 +4406,269 @@
       </p:grpSpPr>
       <p:sp>
         <p:nvSpPr>
-          <p:cNvPr id="2" name="Title 1"/>
-          <p:cNvSpPr>
-            <a:spLocks noGrp="1"/>
-          </p:cNvSpPr>
-          <p:nvPr>
-            <p:ph type="ctrTitle"/>
-          </p:nvPr>
+          <p:cNvPr id="11" name="Rectangle 10"/>
+          <p:cNvSpPr/>
+          <p:nvPr/>
         </p:nvSpPr>
         <p:spPr>
           <a:xfrm>
-            <a:off x="685800" y="2130425"/>
-            <a:ext cx="7772400" cy="1470025"/>
+            <a:off x="0" y="3866920"/>
+            <a:ext cx="9144000" cy="2991080"/>
           </a:xfrm>
+          <a:prstGeom prst="rect">
+            <a:avLst/>
+          </a:prstGeom>
+          <a:gradFill>
+            <a:gsLst>
+              <a:gs pos="0">
+                <a:schemeClr val="bg1">
+                  <a:alpha val="91000"/>
+                </a:schemeClr>
+              </a:gs>
+              <a:gs pos="37000">
+                <a:schemeClr val="bg1">
+                  <a:alpha val="76000"/>
+                </a:schemeClr>
+              </a:gs>
+              <a:gs pos="100000">
+                <a:schemeClr val="bg2">
+                  <a:alpha val="79000"/>
+                </a:schemeClr>
+              </a:gs>
+            </a:gsLst>
+            <a:path path="circle">
+              <a:fillToRect l="50000" t="50000" r="50000" b="50000"/>
+            </a:path>
+          </a:gradFill>
+          <a:ln>
+            <a:noFill/>
+          </a:ln>
         </p:spPr>
+        <p:style>
+          <a:lnRef idx="2">
+            <a:schemeClr val="accent1">
+              <a:shade val="50000"/>
+            </a:schemeClr>
+          </a:lnRef>
+          <a:fillRef idx="1">
+            <a:schemeClr val="accent1"/>
+          </a:fillRef>
+          <a:effectRef idx="0">
+            <a:schemeClr val="accent1"/>
+          </a:effectRef>
+          <a:fontRef idx="minor">
+            <a:schemeClr val="lt1"/>
+          </a:fontRef>
+        </p:style>
         <p:txBody>
-          <a:bodyPr/>
+          <a:bodyPr rtlCol="0" anchor="ctr"/>
           <a:lstStyle/>
           <a:p>
-            <a:r>
-              <a:rPr lang="en-US" smtClean="0"/>
-              <a:t>Click to edit Master title style</a:t>
-            </a:r>
+            <a:pPr algn="ctr"/>
+            <a:endParaRPr lang="en-US"/>
+          </a:p>
+        </p:txBody>
+      </p:sp>
+      <p:sp>
+        <p:nvSpPr>
+          <p:cNvPr id="12" name="Rectangle 11"/>
+          <p:cNvSpPr/>
+          <p:nvPr/>
+        </p:nvSpPr>
+        <p:spPr>
+          <a:xfrm>
+            <a:off x="0" y="0"/>
+            <a:ext cx="9144000" cy="3866920"/>
+          </a:xfrm>
+          <a:prstGeom prst="rect">
+            <a:avLst/>
+          </a:prstGeom>
+          <a:gradFill flip="none" rotWithShape="1">
+            <a:gsLst>
+              <a:gs pos="0">
+                <a:schemeClr val="bg1">
+                  <a:alpha val="89000"/>
+                </a:schemeClr>
+              </a:gs>
+              <a:gs pos="48000">
+                <a:schemeClr val="bg1">
+                  <a:alpha val="62000"/>
+                </a:schemeClr>
+              </a:gs>
+              <a:gs pos="100000">
+                <a:schemeClr val="bg2">
+                  <a:alpha val="79000"/>
+                </a:schemeClr>
+              </a:gs>
+            </a:gsLst>
+            <a:path path="circle">
+              <a:fillToRect l="50000" t="50000" r="50000" b="50000"/>
+            </a:path>
+            <a:tileRect/>
+          </a:gradFill>
+          <a:ln>
+            <a:noFill/>
+          </a:ln>
+        </p:spPr>
+        <p:style>
+          <a:lnRef idx="2">
+            <a:schemeClr val="accent1">
+              <a:shade val="50000"/>
+            </a:schemeClr>
+          </a:lnRef>
+          <a:fillRef idx="1">
+            <a:schemeClr val="accent1"/>
+          </a:fillRef>
+          <a:effectRef idx="0">
+            <a:schemeClr val="accent1"/>
+          </a:effectRef>
+          <a:fontRef idx="minor">
+            <a:schemeClr val="lt1"/>
+          </a:fontRef>
+        </p:style>
+        <p:txBody>
+          <a:bodyPr rtlCol="0" anchor="ctr"/>
+          <a:lstStyle/>
+          <a:p>
+            <a:pPr algn="ctr"/>
+            <a:endParaRPr lang="en-US" dirty="0"/>
+          </a:p>
+        </p:txBody>
+      </p:sp>
+      <p:sp>
+        <p:nvSpPr>
+          <p:cNvPr id="13" name="Rectangle 12"/>
+          <p:cNvSpPr/>
+          <p:nvPr/>
+        </p:nvSpPr>
+        <p:spPr>
+          <a:xfrm>
+            <a:off x="0" y="2652311"/>
+            <a:ext cx="9144000" cy="2286000"/>
+          </a:xfrm>
+          <a:prstGeom prst="rect">
+            <a:avLst/>
+          </a:prstGeom>
+          <a:gradFill flip="none" rotWithShape="1">
+            <a:gsLst>
+              <a:gs pos="0">
+                <a:schemeClr val="bg1">
+                  <a:alpha val="0"/>
+                </a:schemeClr>
+              </a:gs>
+              <a:gs pos="29000">
+                <a:schemeClr val="bg1">
+                  <a:alpha val="30000"/>
+                </a:schemeClr>
+              </a:gs>
+              <a:gs pos="45000">
+                <a:schemeClr val="bg2">
+                  <a:alpha val="40000"/>
+                </a:schemeClr>
+              </a:gs>
+              <a:gs pos="55000">
+                <a:schemeClr val="bg1">
+                  <a:alpha val="26000"/>
+                </a:schemeClr>
+              </a:gs>
+              <a:gs pos="65000">
+                <a:schemeClr val="bg2">
+                  <a:alpha val="60000"/>
+                </a:schemeClr>
+              </a:gs>
+              <a:gs pos="100000">
+                <a:schemeClr val="bg1">
+                  <a:alpha val="0"/>
+                </a:schemeClr>
+              </a:gs>
+            </a:gsLst>
+            <a:lin ang="5400000" scaled="0"/>
+            <a:tileRect/>
+          </a:gradFill>
+          <a:ln>
+            <a:noFill/>
+          </a:ln>
+        </p:spPr>
+        <p:style>
+          <a:lnRef idx="2">
+            <a:schemeClr val="accent1">
+              <a:shade val="50000"/>
+            </a:schemeClr>
+          </a:lnRef>
+          <a:fillRef idx="1">
+            <a:schemeClr val="accent1"/>
+          </a:fillRef>
+          <a:effectRef idx="0">
+            <a:schemeClr val="accent1"/>
+          </a:effectRef>
+          <a:fontRef idx="minor">
+            <a:schemeClr val="lt1"/>
+          </a:fontRef>
+        </p:style>
+        <p:txBody>
+          <a:bodyPr rtlCol="0" anchor="ctr"/>
+          <a:lstStyle/>
+          <a:p>
+            <a:pPr algn="ctr"/>
+            <a:endParaRPr lang="en-US"/>
+          </a:p>
+        </p:txBody>
+      </p:sp>
+      <p:sp>
+        <p:nvSpPr>
+          <p:cNvPr id="14" name="Oval 13"/>
+          <p:cNvSpPr/>
+          <p:nvPr/>
+        </p:nvSpPr>
+        <p:spPr>
+          <a:xfrm>
+            <a:off x="0" y="1600200"/>
+            <a:ext cx="9144000" cy="5105400"/>
+          </a:xfrm>
+          <a:prstGeom prst="ellipse">
+            <a:avLst/>
+          </a:prstGeom>
+          <a:gradFill flip="none" rotWithShape="1">
+            <a:gsLst>
+              <a:gs pos="0">
+                <a:schemeClr val="bg1"/>
+              </a:gs>
+              <a:gs pos="54000">
+                <a:schemeClr val="bg1">
+                  <a:alpha val="0"/>
+                </a:schemeClr>
+              </a:gs>
+            </a:gsLst>
+            <a:path path="circle">
+              <a:fillToRect l="50000" t="50000" r="50000" b="50000"/>
+            </a:path>
+            <a:tileRect/>
+          </a:gradFill>
+          <a:ln>
+            <a:noFill/>
+          </a:ln>
+        </p:spPr>
+        <p:style>
+          <a:lnRef idx="2">
+            <a:schemeClr val="accent1">
+              <a:shade val="50000"/>
+            </a:schemeClr>
+          </a:lnRef>
+          <a:fillRef idx="1">
+            <a:schemeClr val="accent1"/>
+          </a:fillRef>
+          <a:effectRef idx="0">
+            <a:schemeClr val="accent1"/>
+          </a:effectRef>
+          <a:fontRef idx="minor">
+            <a:schemeClr val="lt1"/>
+          </a:fontRef>
+        </p:style>
+        <p:txBody>
+          <a:bodyPr rtlCol="0" anchor="ctr"/>
+          <a:lstStyle/>
+          <a:p>
+            <a:pPr algn="ctr"/>
             <a:endParaRPr lang="en-US"/>
           </a:p>
         </p:txBody>
@@ -4499,20 +4685,20 @@
         </p:nvSpPr>
         <p:spPr>
           <a:xfrm>
-            <a:off x="1371600" y="3886200"/>
-            <a:ext cx="6400800" cy="1752600"/>
+            <a:off x="1473795" y="5052545"/>
+            <a:ext cx="5637010" cy="882119"/>
           </a:xfrm>
         </p:spPr>
         <p:txBody>
-          <a:bodyPr/>
+          <a:bodyPr>
+            <a:normAutofit/>
+          </a:bodyPr>
           <a:lstStyle>
-            <a:lvl1pPr marL="0" indent="0" algn="ctr">
+            <a:lvl1pPr marL="0" indent="0" algn="l">
               <a:buNone/>
-              <a:defRPr>
+              <a:defRPr sz="2200">
                 <a:solidFill>
-                  <a:schemeClr val="tx1">
-                    <a:tint val="75000"/>
-                  </a:schemeClr>
+                  <a:schemeClr val="tx2"/>
                 </a:solidFill>
               </a:defRPr>
             </a:lvl1pPr>
@@ -4602,7 +4788,7 @@
               <a:rPr lang="en-US" smtClean="0"/>
               <a:t>Click to edit Master subtitle style</a:t>
             </a:r>
-            <a:endParaRPr lang="en-US"/>
+            <a:endParaRPr lang="en-US" dirty="0"/>
           </a:p>
         </p:txBody>
       </p:sp>
@@ -4673,11 +4859,53 @@
           </a:p>
         </p:txBody>
       </p:sp>
+      <p:sp>
+        <p:nvSpPr>
+          <p:cNvPr id="2" name="Title 1"/>
+          <p:cNvSpPr>
+            <a:spLocks noGrp="1"/>
+          </p:cNvSpPr>
+          <p:nvPr>
+            <p:ph type="ctrTitle"/>
+          </p:nvPr>
+        </p:nvSpPr>
+        <p:spPr>
+          <a:xfrm>
+            <a:off x="817581" y="3132290"/>
+            <a:ext cx="7175351" cy="1793167"/>
+          </a:xfrm>
+          <a:effectLst/>
+        </p:spPr>
+        <p:txBody>
+          <a:bodyPr>
+            <a:noAutofit/>
+          </a:bodyPr>
+          <a:lstStyle>
+            <a:lvl1pPr marL="640080" indent="-457200" algn="l">
+              <a:defRPr sz="5400"/>
+            </a:lvl1pPr>
+          </a:lstStyle>
+          <a:p>
+            <a:r>
+              <a:rPr lang="en-US" smtClean="0"/>
+              <a:t>Click to edit Master title style</a:t>
+            </a:r>
+            <a:endParaRPr lang="en-US" dirty="0"/>
+          </a:p>
+        </p:txBody>
+      </p:sp>
     </p:spTree>
   </p:cSld>
   <p:clrMapOvr>
     <a:masterClrMapping/>
   </p:clrMapOvr>
+  <p:timing>
+    <p:tnLst>
+      <p:par>
+        <p:cTn id="1" dur="indefinite" restart="never" nodeType="tmRoot"/>
+      </p:par>
+    </p:tnLst>
+  </p:timing>
 </p:sldLayout>
 </file>
 
@@ -4731,7 +4959,12 @@
             <p:ph type="body" orient="vert" idx="1"/>
           </p:nvPr>
         </p:nvSpPr>
-        <p:spPr/>
+        <p:spPr>
+          <a:xfrm>
+            <a:off x="1905000" y="731519"/>
+            <a:ext cx="6400800" cy="3474720"/>
+          </a:xfrm>
+        </p:spPr>
         <p:txBody>
           <a:bodyPr vert="eaVert"/>
           <a:lstStyle/>
@@ -4845,6 +5078,13 @@
   <p:clrMapOvr>
     <a:masterClrMapping/>
   </p:clrMapOvr>
+  <p:timing>
+    <p:tnLst>
+      <p:par>
+        <p:cTn id="1" dur="indefinite" restart="never" nodeType="tmRoot"/>
+      </p:par>
+    </p:tnLst>
+  </p:timing>
 </p:sldLayout>
 </file>
 
@@ -4877,13 +5117,18 @@
         </p:nvSpPr>
         <p:spPr>
           <a:xfrm>
-            <a:off x="6629400" y="274638"/>
-            <a:ext cx="2057400" cy="5851525"/>
+            <a:off x="1153758" y="376517"/>
+            <a:ext cx="2057400" cy="5238339"/>
           </a:xfrm>
+          <a:effectLst/>
         </p:spPr>
         <p:txBody>
           <a:bodyPr vert="eaVert"/>
-          <a:lstStyle/>
+          <a:lstStyle>
+            <a:lvl1pPr algn="l">
+              <a:defRPr/>
+            </a:lvl1pPr>
+          </a:lstStyle>
           <a:p>
             <a:r>
               <a:rPr lang="en-US" smtClean="0"/>
@@ -4905,8 +5150,8 @@
         </p:nvSpPr>
         <p:spPr>
           <a:xfrm>
-            <a:off x="457200" y="274638"/>
-            <a:ext cx="6019800" cy="5851525"/>
+            <a:off x="3324113" y="731519"/>
+            <a:ext cx="4829287" cy="4894729"/>
           </a:xfrm>
         </p:spPr>
         <p:txBody>
@@ -4946,7 +5191,7 @@
               <a:rPr lang="en-US" smtClean="0"/>
               <a:t>Fifth level</a:t>
             </a:r>
-            <a:endParaRPr lang="en-US"/>
+            <a:endParaRPr lang="en-US" dirty="0"/>
           </a:p>
         </p:txBody>
       </p:sp>
@@ -5022,6 +5267,13 @@
   <p:clrMapOvr>
     <a:masterClrMapping/>
   </p:clrMapOvr>
+  <p:timing>
+    <p:tnLst>
+      <p:par>
+        <p:cTn id="1" dur="indefinite" restart="never" nodeType="tmRoot"/>
+      </p:par>
+    </p:tnLst>
+  </p:timing>
 </p:sldLayout>
 </file>
 
@@ -5044,81 +5296,6 @@
       </p:grpSpPr>
       <p:sp>
         <p:nvSpPr>
-          <p:cNvPr id="2" name="Title 1"/>
-          <p:cNvSpPr>
-            <a:spLocks noGrp="1"/>
-          </p:cNvSpPr>
-          <p:nvPr>
-            <p:ph type="title"/>
-          </p:nvPr>
-        </p:nvSpPr>
-        <p:spPr/>
-        <p:txBody>
-          <a:bodyPr/>
-          <a:lstStyle/>
-          <a:p>
-            <a:r>
-              <a:rPr lang="en-US" smtClean="0"/>
-              <a:t>Click to edit Master title style</a:t>
-            </a:r>
-            <a:endParaRPr lang="en-US"/>
-          </a:p>
-        </p:txBody>
-      </p:sp>
-      <p:sp>
-        <p:nvSpPr>
-          <p:cNvPr id="3" name="Content Placeholder 2"/>
-          <p:cNvSpPr>
-            <a:spLocks noGrp="1"/>
-          </p:cNvSpPr>
-          <p:nvPr>
-            <p:ph idx="1"/>
-          </p:nvPr>
-        </p:nvSpPr>
-        <p:spPr/>
-        <p:txBody>
-          <a:bodyPr/>
-          <a:lstStyle/>
-          <a:p>
-            <a:pPr lvl="0"/>
-            <a:r>
-              <a:rPr lang="en-US" smtClean="0"/>
-              <a:t>Click to edit Master text styles</a:t>
-            </a:r>
-          </a:p>
-          <a:p>
-            <a:pPr lvl="1"/>
-            <a:r>
-              <a:rPr lang="en-US" smtClean="0"/>
-              <a:t>Second level</a:t>
-            </a:r>
-          </a:p>
-          <a:p>
-            <a:pPr lvl="2"/>
-            <a:r>
-              <a:rPr lang="en-US" smtClean="0"/>
-              <a:t>Third level</a:t>
-            </a:r>
-          </a:p>
-          <a:p>
-            <a:pPr lvl="3"/>
-            <a:r>
-              <a:rPr lang="en-US" smtClean="0"/>
-              <a:t>Fourth level</a:t>
-            </a:r>
-          </a:p>
-          <a:p>
-            <a:pPr lvl="4"/>
-            <a:r>
-              <a:rPr lang="en-US" smtClean="0"/>
-              <a:t>Fifth level</a:t>
-            </a:r>
-            <a:endParaRPr lang="en-US"/>
-          </a:p>
-        </p:txBody>
-      </p:sp>
-      <p:sp>
-        <p:nvSpPr>
           <p:cNvPr id="4" name="Date Placeholder 3"/>
           <p:cNvSpPr>
             <a:spLocks noGrp="1"/>
@@ -5184,11 +5361,98 @@
           </a:p>
         </p:txBody>
       </p:sp>
+      <p:sp>
+        <p:nvSpPr>
+          <p:cNvPr id="8" name="Title 7"/>
+          <p:cNvSpPr>
+            <a:spLocks noGrp="1"/>
+          </p:cNvSpPr>
+          <p:nvPr>
+            <p:ph type="title"/>
+          </p:nvPr>
+        </p:nvSpPr>
+        <p:spPr/>
+        <p:txBody>
+          <a:bodyPr/>
+          <a:lstStyle/>
+          <a:p>
+            <a:r>
+              <a:rPr lang="en-US" smtClean="0"/>
+              <a:t>Click to edit Master title style</a:t>
+            </a:r>
+            <a:endParaRPr lang="en-US"/>
+          </a:p>
+        </p:txBody>
+      </p:sp>
+      <p:sp>
+        <p:nvSpPr>
+          <p:cNvPr id="10" name="Content Placeholder 9"/>
+          <p:cNvSpPr>
+            <a:spLocks noGrp="1"/>
+          </p:cNvSpPr>
+          <p:nvPr>
+            <p:ph sz="quarter" idx="13"/>
+          </p:nvPr>
+        </p:nvSpPr>
+        <p:spPr>
+          <a:xfrm>
+            <a:off x="1143000" y="731520"/>
+            <a:ext cx="6400800" cy="3474720"/>
+          </a:xfrm>
+        </p:spPr>
+        <p:txBody>
+          <a:bodyPr/>
+          <a:lstStyle/>
+          <a:p>
+            <a:pPr lvl="0"/>
+            <a:r>
+              <a:rPr lang="en-US" smtClean="0"/>
+              <a:t>Click to edit Master text styles</a:t>
+            </a:r>
+          </a:p>
+          <a:p>
+            <a:pPr lvl="1"/>
+            <a:r>
+              <a:rPr lang="en-US" smtClean="0"/>
+              <a:t>Second level</a:t>
+            </a:r>
+          </a:p>
+          <a:p>
+            <a:pPr lvl="2"/>
+            <a:r>
+              <a:rPr lang="en-US" smtClean="0"/>
+              <a:t>Third level</a:t>
+            </a:r>
+          </a:p>
+          <a:p>
+            <a:pPr lvl="3"/>
+            <a:r>
+              <a:rPr lang="en-US" smtClean="0"/>
+              <a:t>Fourth level</a:t>
+            </a:r>
+          </a:p>
+          <a:p>
+            <a:pPr lvl="4"/>
+            <a:r>
+              <a:rPr lang="en-US" smtClean="0"/>
+              <a:t>Fifth level</a:t>
+            </a:r>
+            <a:endParaRPr lang="en-US" dirty="0"/>
+          </a:p>
+        </p:txBody>
+      </p:sp>
     </p:spTree>
   </p:cSld>
   <p:clrMapOvr>
     <a:masterClrMapping/>
   </p:clrMapOvr>
+  <p:timing>
+    <p:tnLst>
+      <p:par>
+        <p:cTn id="1" dur="indefinite" restart="never" nodeType="tmRoot"/>
+      </p:par>
+    </p:tnLst>
+  </p:timing>
 </p:sldLayout>
 </file>
 
@@ -5211,6 +5475,275 @@
       </p:grpSpPr>
       <p:sp>
         <p:nvSpPr>
+          <p:cNvPr id="7" name="Rectangle 6"/>
+          <p:cNvSpPr/>
+          <p:nvPr/>
+        </p:nvSpPr>
+        <p:spPr>
+          <a:xfrm>
+            <a:off x="0" y="3866920"/>
+            <a:ext cx="9144000" cy="2991080"/>
+          </a:xfrm>
+          <a:prstGeom prst="rect">
+            <a:avLst/>
+          </a:prstGeom>
+          <a:gradFill>
+            <a:gsLst>
+              <a:gs pos="0">
+                <a:schemeClr val="bg1">
+                  <a:alpha val="92000"/>
+                </a:schemeClr>
+              </a:gs>
+              <a:gs pos="37000">
+                <a:schemeClr val="bg1">
+                  <a:alpha val="77000"/>
+                </a:schemeClr>
+              </a:gs>
+              <a:gs pos="100000">
+                <a:schemeClr val="bg2">
+                  <a:alpha val="80000"/>
+                </a:schemeClr>
+              </a:gs>
+            </a:gsLst>
+            <a:path path="circle">
+              <a:fillToRect l="50000" t="50000" r="50000" b="50000"/>
+            </a:path>
+          </a:gradFill>
+          <a:ln>
+            <a:noFill/>
+          </a:ln>
+        </p:spPr>
+        <p:style>
+          <a:lnRef idx="2">
+            <a:schemeClr val="accent1">
+              <a:shade val="50000"/>
+            </a:schemeClr>
+          </a:lnRef>
+          <a:fillRef idx="1">
+            <a:schemeClr val="accent1"/>
+          </a:fillRef>
+          <a:effectRef idx="0">
+            <a:schemeClr val="accent1"/>
+          </a:effectRef>
+          <a:fontRef idx="minor">
+            <a:schemeClr val="lt1"/>
+          </a:fontRef>
+        </p:style>
+        <p:txBody>
+          <a:bodyPr rtlCol="0" anchor="ctr"/>
+          <a:lstStyle/>
+          <a:p>
+            <a:pPr algn="ctr"/>
+            <a:endParaRPr lang="en-US"/>
+          </a:p>
+        </p:txBody>
+      </p:sp>
+      <p:sp>
+        <p:nvSpPr>
+          <p:cNvPr id="8" name="Rectangle 7"/>
+          <p:cNvSpPr/>
+          <p:nvPr/>
+        </p:nvSpPr>
+        <p:spPr>
+          <a:xfrm>
+            <a:off x="0" y="0"/>
+            <a:ext cx="9144000" cy="3866920"/>
+          </a:xfrm>
+          <a:prstGeom prst="rect">
+            <a:avLst/>
+          </a:prstGeom>
+          <a:gradFill flip="none" rotWithShape="1">
+            <a:gsLst>
+              <a:gs pos="0">
+                <a:schemeClr val="bg1">
+                  <a:alpha val="90000"/>
+                </a:schemeClr>
+              </a:gs>
+              <a:gs pos="48000">
+                <a:schemeClr val="bg1">
+                  <a:alpha val="63000"/>
+                </a:schemeClr>
+              </a:gs>
+              <a:gs pos="100000">
+                <a:schemeClr val="bg2">
+                  <a:alpha val="80000"/>
+                </a:schemeClr>
+              </a:gs>
+            </a:gsLst>
+            <a:path path="circle">
+              <a:fillToRect l="50000" t="50000" r="50000" b="50000"/>
+            </a:path>
+            <a:tileRect/>
+          </a:gradFill>
+          <a:ln>
+            <a:noFill/>
+          </a:ln>
+        </p:spPr>
+        <p:style>
+          <a:lnRef idx="2">
+            <a:schemeClr val="accent1">
+              <a:shade val="50000"/>
+            </a:schemeClr>
+          </a:lnRef>
+          <a:fillRef idx="1">
+            <a:schemeClr val="accent1"/>
+          </a:fillRef>
+          <a:effectRef idx="0">
+            <a:schemeClr val="accent1"/>
+          </a:effectRef>
+          <a:fontRef idx="minor">
+            <a:schemeClr val="lt1"/>
+          </a:fontRef>
+        </p:style>
+        <p:txBody>
+          <a:bodyPr rtlCol="0" anchor="ctr"/>
+          <a:lstStyle/>
+          <a:p>
+            <a:pPr algn="ctr"/>
+            <a:endParaRPr lang="en-US" dirty="0"/>
+          </a:p>
+        </p:txBody>
+      </p:sp>
+      <p:sp>
+        <p:nvSpPr>
+          <p:cNvPr id="9" name="Rectangle 8"/>
+          <p:cNvSpPr/>
+          <p:nvPr/>
+        </p:nvSpPr>
+        <p:spPr>
+          <a:xfrm>
+            <a:off x="0" y="2652311"/>
+            <a:ext cx="9144000" cy="2286000"/>
+          </a:xfrm>
+          <a:prstGeom prst="rect">
+            <a:avLst/>
+          </a:prstGeom>
+          <a:gradFill flip="none" rotWithShape="1">
+            <a:gsLst>
+              <a:gs pos="0">
+                <a:schemeClr val="bg1">
+                  <a:alpha val="0"/>
+                </a:schemeClr>
+              </a:gs>
+              <a:gs pos="29000">
+                <a:schemeClr val="bg1">
+                  <a:alpha val="30000"/>
+                </a:schemeClr>
+              </a:gs>
+              <a:gs pos="45000">
+                <a:schemeClr val="bg2">
+                  <a:alpha val="40000"/>
+                </a:schemeClr>
+              </a:gs>
+              <a:gs pos="55000">
+                <a:schemeClr val="bg1">
+                  <a:alpha val="26000"/>
+                </a:schemeClr>
+              </a:gs>
+              <a:gs pos="65000">
+                <a:schemeClr val="bg2">
+                  <a:alpha val="60000"/>
+                </a:schemeClr>
+              </a:gs>
+              <a:gs pos="100000">
+                <a:schemeClr val="bg1">
+                  <a:alpha val="0"/>
+                </a:schemeClr>
+              </a:gs>
+            </a:gsLst>
+            <a:lin ang="5400000" scaled="0"/>
+            <a:tileRect/>
+          </a:gradFill>
+          <a:ln>
+            <a:noFill/>
+          </a:ln>
+        </p:spPr>
+        <p:style>
+          <a:lnRef idx="2">
+            <a:schemeClr val="accent1">
+              <a:shade val="50000"/>
+            </a:schemeClr>
+          </a:lnRef>
+          <a:fillRef idx="1">
+            <a:schemeClr val="accent1"/>
+          </a:fillRef>
+          <a:effectRef idx="0">
+            <a:schemeClr val="accent1"/>
+          </a:effectRef>
+          <a:fontRef idx="minor">
+            <a:schemeClr val="lt1"/>
+          </a:fontRef>
+        </p:style>
+        <p:txBody>
+          <a:bodyPr rtlCol="0" anchor="ctr"/>
+          <a:lstStyle/>
+          <a:p>
+            <a:pPr algn="ctr"/>
+            <a:endParaRPr lang="en-US"/>
+          </a:p>
+        </p:txBody>
+      </p:sp>
+      <p:sp>
+        <p:nvSpPr>
+          <p:cNvPr id="10" name="Oval 9"/>
+          <p:cNvSpPr/>
+          <p:nvPr/>
+        </p:nvSpPr>
+        <p:spPr>
+          <a:xfrm>
+            <a:off x="0" y="1600200"/>
+            <a:ext cx="9144000" cy="5105400"/>
+          </a:xfrm>
+          <a:prstGeom prst="ellipse">
+            <a:avLst/>
+          </a:prstGeom>
+          <a:gradFill flip="none" rotWithShape="1">
+            <a:gsLst>
+              <a:gs pos="0">
+                <a:schemeClr val="bg1"/>
+              </a:gs>
+              <a:gs pos="54000">
+                <a:schemeClr val="bg1">
+                  <a:alpha val="0"/>
+                </a:schemeClr>
+              </a:gs>
+            </a:gsLst>
+            <a:path path="circle">
+              <a:fillToRect l="50000" t="50000" r="50000" b="50000"/>
+            </a:path>
+            <a:tileRect/>
+          </a:gradFill>
+          <a:ln>
+            <a:noFill/>
+          </a:ln>
+        </p:spPr>
+        <p:style>
+          <a:lnRef idx="2">
+            <a:schemeClr val="accent1">
+              <a:shade val="50000"/>
+            </a:schemeClr>
+          </a:lnRef>
+          <a:fillRef idx="1">
+            <a:schemeClr val="accent1"/>
+          </a:fillRef>
+          <a:effectRef idx="0">
+            <a:schemeClr val="accent1"/>
+          </a:effectRef>
+          <a:fontRef idx="minor">
+            <a:schemeClr val="lt1"/>
+          </a:fontRef>
+        </p:style>
+        <p:txBody>
+          <a:bodyPr rtlCol="0" anchor="ctr"/>
+          <a:lstStyle/>
+          <a:p>
+            <a:pPr algn="ctr"/>
+            <a:endParaRPr lang="en-US"/>
+          </a:p>
+        </p:txBody>
+      </p:sp>
+      <p:sp>
+        <p:nvSpPr>
           <p:cNvPr id="2" name="Title 1"/>
           <p:cNvSpPr>
             <a:spLocks noGrp="1"/>
@@ -5221,15 +5754,16 @@
         </p:nvSpPr>
         <p:spPr>
           <a:xfrm>
-            <a:off x="722313" y="4406900"/>
-            <a:ext cx="7772400" cy="1362075"/>
+            <a:off x="2033195" y="2172648"/>
+            <a:ext cx="5966666" cy="2423346"/>
           </a:xfrm>
+          <a:effectLst/>
         </p:spPr>
         <p:txBody>
-          <a:bodyPr anchor="t"/>
+          <a:bodyPr anchor="b"/>
           <a:lstStyle>
-            <a:lvl1pPr algn="l">
-              <a:defRPr sz="4000" b="1" cap="all"/>
+            <a:lvl1pPr algn="r">
+              <a:defRPr sz="4600" b="1" cap="none" baseline="0"/>
             </a:lvl1pPr>
           </a:lstStyle>
           <a:p>
@@ -5237,7 +5771,7 @@
               <a:rPr lang="en-US" smtClean="0"/>
               <a:t>Click to edit Master title style</a:t>
             </a:r>
-            <a:endParaRPr lang="en-US"/>
+            <a:endParaRPr lang="en-US" dirty="0"/>
           </a:p>
         </p:txBody>
       </p:sp>
@@ -5253,20 +5787,18 @@
         </p:nvSpPr>
         <p:spPr>
           <a:xfrm>
-            <a:off x="722313" y="2906713"/>
-            <a:ext cx="7772400" cy="1500187"/>
+            <a:off x="2022438" y="4607511"/>
+            <a:ext cx="5970494" cy="835460"/>
           </a:xfrm>
         </p:spPr>
         <p:txBody>
-          <a:bodyPr anchor="b"/>
+          <a:bodyPr anchor="t"/>
           <a:lstStyle>
-            <a:lvl1pPr marL="0" indent="0">
+            <a:lvl1pPr marL="0" indent="0" algn="r">
               <a:buNone/>
               <a:defRPr sz="2000">
                 <a:solidFill>
-                  <a:schemeClr val="tx1">
-                    <a:tint val="75000"/>
-                  </a:schemeClr>
+                  <a:schemeClr val="tx2"/>
                 </a:solidFill>
               </a:defRPr>
             </a:lvl1pPr>
@@ -5432,6 +5964,13 @@
   <p:clrMapOvr>
     <a:masterClrMapping/>
   </p:clrMapOvr>
+  <p:timing>
+    <p:tnLst>
+      <p:par>
+        <p:cTn id="1" dur="indefinite" restart="never" nodeType="tmRoot"/>
+      </p:par>
+    </p:tnLst>
+  </p:timing>
 </p:sldLayout>
 </file>
 
@@ -5454,199 +5993,6 @@
       </p:grpSpPr>
       <p:sp>
         <p:nvSpPr>
-          <p:cNvPr id="2" name="Title 1"/>
-          <p:cNvSpPr>
-            <a:spLocks noGrp="1"/>
-          </p:cNvSpPr>
-          <p:nvPr>
-            <p:ph type="title"/>
-          </p:nvPr>
-        </p:nvSpPr>
-        <p:spPr/>
-        <p:txBody>
-          <a:bodyPr/>
-          <a:lstStyle/>
-          <a:p>
-            <a:r>
-              <a:rPr lang="en-US" smtClean="0"/>
-              <a:t>Click to edit Master title style</a:t>
-            </a:r>
-            <a:endParaRPr lang="en-US"/>
-          </a:p>
-        </p:txBody>
-      </p:sp>
-      <p:sp>
-        <p:nvSpPr>
-          <p:cNvPr id="3" name="Content Placeholder 2"/>
-          <p:cNvSpPr>
-            <a:spLocks noGrp="1"/>
-          </p:cNvSpPr>
-          <p:nvPr>
-            <p:ph sz="half" idx="1"/>
-          </p:nvPr>
-        </p:nvSpPr>
-        <p:spPr>
-          <a:xfrm>
-            <a:off x="457200" y="1600200"/>
-            <a:ext cx="4038600" cy="4525963"/>
-          </a:xfrm>
-        </p:spPr>
-        <p:txBody>
-          <a:bodyPr/>
-          <a:lstStyle>
-            <a:lvl1pPr>
-              <a:defRPr sz="2800"/>
-            </a:lvl1pPr>
-            <a:lvl2pPr>
-              <a:defRPr sz="2400"/>
-            </a:lvl2pPr>
-            <a:lvl3pPr>
-              <a:defRPr sz="2000"/>
-            </a:lvl3pPr>
-            <a:lvl4pPr>
-              <a:defRPr sz="1800"/>
-            </a:lvl4pPr>
-            <a:lvl5pPr>
-              <a:defRPr sz="1800"/>
-            </a:lvl5pPr>
-            <a:lvl6pPr>
-              <a:defRPr sz="1800"/>
-            </a:lvl6pPr>
-            <a:lvl7pPr>
-              <a:defRPr sz="1800"/>
-            </a:lvl7pPr>
-            <a:lvl8pPr>
-              <a:defRPr sz="1800"/>
-            </a:lvl8pPr>
-            <a:lvl9pPr>
-              <a:defRPr sz="1800"/>
-            </a:lvl9pPr>
-          </a:lstStyle>
-          <a:p>
-            <a:pPr lvl="0"/>
-            <a:r>
-              <a:rPr lang="en-US" smtClean="0"/>
-              <a:t>Click to edit Master text styles</a:t>
-            </a:r>
-          </a:p>
-          <a:p>
-            <a:pPr lvl="1"/>
-            <a:r>
-              <a:rPr lang="en-US" smtClean="0"/>
-              <a:t>Second level</a:t>
-            </a:r>
-          </a:p>
-          <a:p>
-            <a:pPr lvl="2"/>
-            <a:r>
-              <a:rPr lang="en-US" smtClean="0"/>
-              <a:t>Third level</a:t>
-            </a:r>
-          </a:p>
-          <a:p>
-            <a:pPr lvl="3"/>
-            <a:r>
-              <a:rPr lang="en-US" smtClean="0"/>
-              <a:t>Fourth level</a:t>
-            </a:r>
-          </a:p>
-          <a:p>
-            <a:pPr lvl="4"/>
-            <a:r>
-              <a:rPr lang="en-US" smtClean="0"/>
-              <a:t>Fifth level</a:t>
-            </a:r>
-            <a:endParaRPr lang="en-US"/>
-          </a:p>
-        </p:txBody>
-      </p:sp>
-      <p:sp>
-        <p:nvSpPr>
-          <p:cNvPr id="4" name="Content Placeholder 3"/>
-          <p:cNvSpPr>
-            <a:spLocks noGrp="1"/>
-          </p:cNvSpPr>
-          <p:nvPr>
-            <p:ph sz="half" idx="2"/>
-          </p:nvPr>
-        </p:nvSpPr>
-        <p:spPr>
-          <a:xfrm>
-            <a:off x="4648200" y="1600200"/>
-            <a:ext cx="4038600" cy="4525963"/>
-          </a:xfrm>
-        </p:spPr>
-        <p:txBody>
-          <a:bodyPr/>
-          <a:lstStyle>
-            <a:lvl1pPr>
-              <a:defRPr sz="2800"/>
-            </a:lvl1pPr>
-            <a:lvl2pPr>
-              <a:defRPr sz="2400"/>
-            </a:lvl2pPr>
-            <a:lvl3pPr>
-              <a:defRPr sz="2000"/>
-            </a:lvl3pPr>
-            <a:lvl4pPr>
-              <a:defRPr sz="1800"/>
-            </a:lvl4pPr>
-            <a:lvl5pPr>
-              <a:defRPr sz="1800"/>
-            </a:lvl5pPr>
-            <a:lvl6pPr>
-              <a:defRPr sz="1800"/>
-            </a:lvl6pPr>
-            <a:lvl7pPr>
-              <a:defRPr sz="1800"/>
-            </a:lvl7pPr>
-            <a:lvl8pPr>
-              <a:defRPr sz="1800"/>
-            </a:lvl8pPr>
-            <a:lvl9pPr>
-              <a:defRPr sz="1800"/>
-            </a:lvl9pPr>
-          </a:lstStyle>
-          <a:p>
-            <a:pPr lvl="0"/>
-            <a:r>
-              <a:rPr lang="en-US" smtClean="0"/>
-              <a:t>Click to edit Master text styles</a:t>
-            </a:r>
-          </a:p>
-          <a:p>
-            <a:pPr lvl="1"/>
-            <a:r>
-              <a:rPr lang="en-US" smtClean="0"/>
-              <a:t>Second level</a:t>
-            </a:r>
-          </a:p>
-          <a:p>
-            <a:pPr lvl="2"/>
-            <a:r>
-              <a:rPr lang="en-US" smtClean="0"/>
-              <a:t>Third level</a:t>
-            </a:r>
-          </a:p>
-          <a:p>
-            <a:pPr lvl="3"/>
-            <a:r>
-              <a:rPr lang="en-US" smtClean="0"/>
-              <a:t>Fourth level</a:t>
-            </a:r>
-          </a:p>
-          <a:p>
-            <a:pPr lvl="4"/>
-            <a:r>
-              <a:rPr lang="en-US" smtClean="0"/>
-              <a:t>Fifth level</a:t>
-            </a:r>
-            <a:endParaRPr lang="en-US"/>
-          </a:p>
-        </p:txBody>
-      </p:sp>
-      <p:sp>
-        <p:nvSpPr>
           <p:cNvPr id="5" name="Date Placeholder 4"/>
           <p:cNvSpPr>
             <a:spLocks noGrp="1"/>
@@ -5712,11 +6058,155 @@
           </a:p>
         </p:txBody>
       </p:sp>
+      <p:sp>
+        <p:nvSpPr>
+          <p:cNvPr id="8" name="Title 7"/>
+          <p:cNvSpPr>
+            <a:spLocks noGrp="1"/>
+          </p:cNvSpPr>
+          <p:nvPr>
+            <p:ph type="title"/>
+          </p:nvPr>
+        </p:nvSpPr>
+        <p:spPr/>
+        <p:txBody>
+          <a:bodyPr/>
+          <a:lstStyle/>
+          <a:p>
+            <a:r>
+              <a:rPr lang="en-US" smtClean="0"/>
+              <a:t>Click to edit Master title style</a:t>
+            </a:r>
+            <a:endParaRPr lang="en-US"/>
+          </a:p>
+        </p:txBody>
+      </p:sp>
+      <p:sp>
+        <p:nvSpPr>
+          <p:cNvPr id="9" name="Content Placeholder 8"/>
+          <p:cNvSpPr>
+            <a:spLocks noGrp="1"/>
+          </p:cNvSpPr>
+          <p:nvPr>
+            <p:ph sz="quarter" idx="13"/>
+          </p:nvPr>
+        </p:nvSpPr>
+        <p:spPr>
+          <a:xfrm>
+            <a:off x="1142999" y="731519"/>
+            <a:ext cx="3346704" cy="3474720"/>
+          </a:xfrm>
+        </p:spPr>
+        <p:txBody>
+          <a:bodyPr/>
+          <a:lstStyle/>
+          <a:p>
+            <a:pPr lvl="0"/>
+            <a:r>
+              <a:rPr lang="en-US" smtClean="0"/>
+              <a:t>Click to edit Master text styles</a:t>
+            </a:r>
+          </a:p>
+          <a:p>
+            <a:pPr lvl="1"/>
+            <a:r>
+              <a:rPr lang="en-US" smtClean="0"/>
+              <a:t>Second level</a:t>
+            </a:r>
+          </a:p>
+          <a:p>
+            <a:pPr lvl="2"/>
+            <a:r>
+              <a:rPr lang="en-US" smtClean="0"/>
+              <a:t>Third level</a:t>
+            </a:r>
+          </a:p>
+          <a:p>
+            <a:pPr lvl="3"/>
+            <a:r>
+              <a:rPr lang="en-US" smtClean="0"/>
+              <a:t>Fourth level</a:t>
+            </a:r>
+          </a:p>
+          <a:p>
+            <a:pPr lvl="4"/>
+            <a:r>
+              <a:rPr lang="en-US" smtClean="0"/>
+              <a:t>Fifth level</a:t>
+            </a:r>
+            <a:endParaRPr lang="en-US"/>
+          </a:p>
+        </p:txBody>
+      </p:sp>
+      <p:sp>
+        <p:nvSpPr>
+          <p:cNvPr id="11" name="Content Placeholder 10"/>
+          <p:cNvSpPr>
+            <a:spLocks noGrp="1"/>
+          </p:cNvSpPr>
+          <p:nvPr>
+            <p:ph sz="quarter" idx="14"/>
+          </p:nvPr>
+        </p:nvSpPr>
+        <p:spPr>
+          <a:xfrm>
+            <a:off x="4645152" y="731520"/>
+            <a:ext cx="3346704" cy="3474720"/>
+          </a:xfrm>
+        </p:spPr>
+        <p:txBody>
+          <a:bodyPr/>
+          <a:lstStyle/>
+          <a:p>
+            <a:pPr lvl="0"/>
+            <a:r>
+              <a:rPr lang="en-US" smtClean="0"/>
+              <a:t>Click to edit Master text styles</a:t>
+            </a:r>
+          </a:p>
+          <a:p>
+            <a:pPr lvl="1"/>
+            <a:r>
+              <a:rPr lang="en-US" smtClean="0"/>
+              <a:t>Second level</a:t>
+            </a:r>
+          </a:p>
+          <a:p>
+            <a:pPr lvl="2"/>
+            <a:r>
+              <a:rPr lang="en-US" smtClean="0"/>
+              <a:t>Third level</a:t>
+            </a:r>
+          </a:p>
+          <a:p>
+            <a:pPr lvl="3"/>
+            <a:r>
+              <a:rPr lang="en-US" smtClean="0"/>
+              <a:t>Fourth level</a:t>
+            </a:r>
+          </a:p>
+          <a:p>
+            <a:pPr lvl="4"/>
+            <a:r>
+              <a:rPr lang="en-US" smtClean="0"/>
+              <a:t>Fifth level</a:t>
+            </a:r>
+            <a:endParaRPr lang="en-US"/>
+          </a:p>
+        </p:txBody>
+      </p:sp>
     </p:spTree>
   </p:cSld>
   <p:clrMapOvr>
     <a:masterClrMapping/>
   </p:clrMapOvr>
+  <p:timing>
+    <p:tnLst>
+      <p:par>
+        <p:cTn id="1" dur="indefinite" restart="never" nodeType="tmRoot"/>
+      </p:par>
+    </p:tnLst>
+  </p:timing>
 </p:sldLayout>
 </file>
 
@@ -5739,33 +6229,6 @@
       </p:grpSpPr>
       <p:sp>
         <p:nvSpPr>
-          <p:cNvPr id="2" name="Title 1"/>
-          <p:cNvSpPr>
-            <a:spLocks noGrp="1"/>
-          </p:cNvSpPr>
-          <p:nvPr>
-            <p:ph type="title"/>
-          </p:nvPr>
-        </p:nvSpPr>
-        <p:spPr/>
-        <p:txBody>
-          <a:bodyPr/>
-          <a:lstStyle>
-            <a:lvl1pPr>
-              <a:defRPr/>
-            </a:lvl1pPr>
-          </a:lstStyle>
-          <a:p>
-            <a:r>
-              <a:rPr lang="en-US" smtClean="0"/>
-              <a:t>Click to edit Master title style</a:t>
-            </a:r>
-            <a:endParaRPr lang="en-US"/>
-          </a:p>
-        </p:txBody>
-      </p:sp>
-      <p:sp>
-        <p:nvSpPr>
           <p:cNvPr id="3" name="Text Placeholder 2"/>
           <p:cNvSpPr>
             <a:spLocks noGrp="1"/>
@@ -5776,16 +6239,42 @@
         </p:nvSpPr>
         <p:spPr>
           <a:xfrm>
-            <a:off x="457200" y="1535113"/>
-            <a:ext cx="4040188" cy="639762"/>
+            <a:off x="1143000" y="731520"/>
+            <a:ext cx="3346704" cy="639762"/>
           </a:xfrm>
         </p:spPr>
         <p:txBody>
-          <a:bodyPr anchor="b"/>
+          <a:bodyPr anchor="b">
+            <a:noAutofit/>
+          </a:bodyPr>
           <a:lstStyle>
-            <a:lvl1pPr marL="0" indent="0">
+            <a:lvl1pPr marL="0" indent="0" algn="ctr">
               <a:buNone/>
-              <a:defRPr sz="2400" b="1"/>
+              <a:defRPr lang="en-US" sz="2400" b="1" i="0" kern="1200" dirty="0" smtClean="0">
+                <a:gradFill>
+                  <a:gsLst>
+                    <a:gs pos="0">
+                      <a:schemeClr val="tx1"/>
+                    </a:gs>
+                    <a:gs pos="40000">
+                      <a:schemeClr val="tx1">
+                        <a:lumMod val="75000"/>
+                        <a:lumOff val="25000"/>
+                      </a:schemeClr>
+                    </a:gs>
+                    <a:gs pos="100000">
+                      <a:schemeClr val="tx2">
+                        <a:alpha val="65000"/>
+                      </a:schemeClr>
+                    </a:gs>
+                  </a:gsLst>
+                  <a:lin ang="5400000" scaled="0"/>
+                </a:gradFill>
+                <a:effectLst/>
+                <a:latin typeface="+mj-lt"/>
+                <a:ea typeface="+mj-ea"/>
+                <a:cs typeface="+mj-cs"/>
+              </a:defRPr>
             </a:lvl1pPr>
             <a:lvl2pPr marL="457200" indent="0">
               <a:buNone/>
@@ -5841,21 +6330,23 @@
         </p:nvSpPr>
         <p:spPr>
           <a:xfrm>
-            <a:off x="457200" y="2174875"/>
-            <a:ext cx="4040188" cy="3951288"/>
+            <a:off x="1156447" y="1400327"/>
+            <a:ext cx="3346704" cy="2743200"/>
           </a:xfrm>
         </p:spPr>
         <p:txBody>
-          <a:bodyPr/>
+          <a:bodyPr>
+            <a:normAutofit/>
+          </a:bodyPr>
           <a:lstStyle>
             <a:lvl1pPr>
-              <a:defRPr sz="2400"/>
+              <a:defRPr sz="1800"/>
             </a:lvl1pPr>
             <a:lvl2pPr>
-              <a:defRPr sz="2000"/>
+              <a:defRPr sz="1800"/>
             </a:lvl2pPr>
             <a:lvl3pPr>
-              <a:defRPr sz="1800"/>
+              <a:defRPr sz="1600"/>
             </a:lvl3pPr>
             <a:lvl4pPr>
               <a:defRPr sz="1600"/>
@@ -5910,7 +6401,7 @@
               <a:rPr lang="en-US" smtClean="0"/>
               <a:t>Fifth level</a:t>
             </a:r>
-            <a:endParaRPr lang="en-US"/>
+            <a:endParaRPr lang="en-US" dirty="0"/>
           </a:p>
         </p:txBody>
       </p:sp>
@@ -5926,16 +6417,42 @@
         </p:nvSpPr>
         <p:spPr>
           <a:xfrm>
-            <a:off x="4645025" y="1535113"/>
-            <a:ext cx="4041775" cy="639762"/>
+            <a:off x="4647302" y="731520"/>
+            <a:ext cx="3346704" cy="639762"/>
           </a:xfrm>
         </p:spPr>
         <p:txBody>
-          <a:bodyPr anchor="b"/>
+          <a:bodyPr anchor="b">
+            <a:noAutofit/>
+          </a:bodyPr>
           <a:lstStyle>
-            <a:lvl1pPr marL="0" indent="0">
+            <a:lvl1pPr marL="0" indent="0" algn="ctr">
               <a:buNone/>
-              <a:defRPr sz="2400" b="1"/>
+              <a:defRPr lang="en-US" sz="2400" b="1" i="0" kern="1200" dirty="0" smtClean="0">
+                <a:gradFill>
+                  <a:gsLst>
+                    <a:gs pos="0">
+                      <a:schemeClr val="tx1"/>
+                    </a:gs>
+                    <a:gs pos="40000">
+                      <a:schemeClr val="tx1">
+                        <a:lumMod val="75000"/>
+                        <a:lumOff val="25000"/>
+                      </a:schemeClr>
+                    </a:gs>
+                    <a:gs pos="100000">
+                      <a:schemeClr val="tx2">
+                        <a:alpha val="65000"/>
+                      </a:schemeClr>
+                    </a:gs>
+                  </a:gsLst>
+                  <a:lin ang="5400000" scaled="0"/>
+                </a:gradFill>
+                <a:effectLst/>
+                <a:latin typeface="+mj-lt"/>
+                <a:ea typeface="+mj-ea"/>
+                <a:cs typeface="+mj-cs"/>
+              </a:defRPr>
             </a:lvl1pPr>
             <a:lvl2pPr marL="457200" indent="0">
               <a:buNone/>
@@ -5971,7 +6488,22 @@
             </a:lvl9pPr>
           </a:lstStyle>
           <a:p>
-            <a:pPr lvl="0"/>
+            <a:pPr marL="0" lvl="0" indent="0" algn="ctr" defTabSz="914400" rtl="0" eaLnBrk="1" latinLnBrk="0" hangingPunct="1">
+              <a:spcBef>
+                <a:spcPct val="20000"/>
+              </a:spcBef>
+              <a:spcAft>
+                <a:spcPts val="300"/>
+              </a:spcAft>
+              <a:buClr>
+                <a:schemeClr val="accent6">
+                  <a:lumMod val="75000"/>
+                </a:schemeClr>
+              </a:buClr>
+              <a:buSzPct val="130000"/>
+              <a:buFont typeface="Georgia" pitchFamily="18" charset="0"/>
+              <a:buNone/>
+            </a:pPr>
             <a:r>
               <a:rPr lang="en-US" smtClean="0"/>
               <a:t>Click to edit Master text styles</a:t>
@@ -5991,21 +6523,23 @@
         </p:nvSpPr>
         <p:spPr>
           <a:xfrm>
-            <a:off x="4645025" y="2174875"/>
-            <a:ext cx="4041775" cy="3951288"/>
+            <a:off x="4645025" y="1399032"/>
+            <a:ext cx="3346704" cy="2743200"/>
           </a:xfrm>
         </p:spPr>
         <p:txBody>
-          <a:bodyPr/>
+          <a:bodyPr>
+            <a:normAutofit/>
+          </a:bodyPr>
           <a:lstStyle>
             <a:lvl1pPr>
-              <a:defRPr sz="2400"/>
+              <a:defRPr sz="1800"/>
             </a:lvl1pPr>
             <a:lvl2pPr>
-              <a:defRPr sz="2000"/>
+              <a:defRPr sz="1800"/>
             </a:lvl2pPr>
             <a:lvl3pPr>
-              <a:defRPr sz="1800"/>
+              <a:defRPr sz="1600"/>
             </a:lvl3pPr>
             <a:lvl4pPr>
               <a:defRPr sz="1600"/>
@@ -6060,7 +6594,7 @@
               <a:rPr lang="en-US" smtClean="0"/>
               <a:t>Fifth level</a:t>
             </a:r>
-            <a:endParaRPr lang="en-US"/>
+            <a:endParaRPr lang="en-US" dirty="0"/>
           </a:p>
         </p:txBody>
       </p:sp>
@@ -6131,11 +6665,41 @@
           </a:p>
         </p:txBody>
       </p:sp>
+      <p:sp>
+        <p:nvSpPr>
+          <p:cNvPr id="10" name="Title 9"/>
+          <p:cNvSpPr>
+            <a:spLocks noGrp="1"/>
+          </p:cNvSpPr>
+          <p:nvPr>
+            <p:ph type="title"/>
+          </p:nvPr>
+        </p:nvSpPr>
+        <p:spPr/>
+        <p:txBody>
+          <a:bodyPr/>
+          <a:lstStyle/>
+          <a:p>
+            <a:r>
+              <a:rPr lang="en-US" smtClean="0"/>
+              <a:t>Click to edit Master title style</a:t>
+            </a:r>
+            <a:endParaRPr lang="en-US" dirty="0"/>
+          </a:p>
+        </p:txBody>
+      </p:sp>
     </p:spTree>
   </p:cSld>
   <p:clrMapOvr>
     <a:masterClrMapping/>
   </p:clrMapOvr>
+  <p:timing>
+    <p:tnLst>
+      <p:par>
+        <p:cTn id="1" dur="indefinite" restart="never" nodeType="tmRoot"/>
+      </p:par>
+    </p:tnLst>
+  </p:timing>
 </p:sldLayout>
 </file>
 
@@ -6175,7 +6739,7 @@
               <a:rPr lang="en-US" smtClean="0"/>
               <a:t>Click to edit Master title style</a:t>
             </a:r>
-            <a:endParaRPr lang="en-US"/>
+            <a:endParaRPr lang="en-US" dirty="0"/>
           </a:p>
         </p:txBody>
       </p:sp>
@@ -6251,6 +6815,13 @@
   <p:clrMapOvr>
     <a:masterClrMapping/>
   </p:clrMapOvr>
+  <p:timing>
+    <p:tnLst>
+      <p:par>
+        <p:cTn id="1" dur="indefinite" restart="never" nodeType="tmRoot"/>
+      </p:par>
+    </p:tnLst>
+  </p:timing>
 </p:sldLayout>
 </file>
 
@@ -6343,6 +6914,13 @@
   <p:clrMapOvr>
     <a:masterClrMapping/>
   </p:clrMapOvr>
+  <p:timing>
+    <p:tnLst>
+      <p:par>
+        <p:cTn id="1" dur="indefinite" restart="never" nodeType="tmRoot"/>
+      </p:par>
+    </p:tnLst>
+  </p:timing>
 </p:sldLayout>
 </file>
 
@@ -6375,15 +6953,20 @@
         </p:nvSpPr>
         <p:spPr>
           <a:xfrm>
-            <a:off x="457200" y="273050"/>
-            <a:ext cx="3008313" cy="1162050"/>
+            <a:off x="839095" y="2209800"/>
+            <a:ext cx="3636085" cy="1258493"/>
           </a:xfrm>
+          <a:effectLst/>
         </p:spPr>
         <p:txBody>
-          <a:bodyPr anchor="b"/>
+          <a:bodyPr anchor="b">
+            <a:noAutofit/>
+          </a:bodyPr>
           <a:lstStyle>
-            <a:lvl1pPr algn="l">
-              <a:defRPr sz="2000" b="1"/>
+            <a:lvl1pPr marL="228600" indent="-228600" algn="l">
+              <a:defRPr sz="2800" b="1">
+                <a:effectLst/>
+              </a:defRPr>
             </a:lvl1pPr>
           </a:lstStyle>
           <a:p>
@@ -6391,7 +6974,7 @@
               <a:rPr lang="en-US" smtClean="0"/>
               <a:t>Click to edit Master title style</a:t>
             </a:r>
-            <a:endParaRPr lang="en-US"/>
+            <a:endParaRPr lang="en-US" dirty="0"/>
           </a:p>
         </p:txBody>
       </p:sp>
@@ -6407,27 +6990,27 @@
         </p:nvSpPr>
         <p:spPr>
           <a:xfrm>
-            <a:off x="3575050" y="273050"/>
-            <a:ext cx="5111750" cy="5853113"/>
+            <a:off x="4593515" y="731520"/>
+            <a:ext cx="4017085" cy="4894730"/>
           </a:xfrm>
         </p:spPr>
         <p:txBody>
-          <a:bodyPr/>
+          <a:bodyPr anchor="ctr"/>
           <a:lstStyle>
             <a:lvl1pPr>
-              <a:defRPr sz="3200"/>
+              <a:defRPr sz="2200"/>
             </a:lvl1pPr>
             <a:lvl2pPr>
-              <a:defRPr sz="2800"/>
+              <a:defRPr sz="2000"/>
             </a:lvl2pPr>
             <a:lvl3pPr>
-              <a:defRPr sz="2400"/>
+              <a:defRPr sz="1800"/>
             </a:lvl3pPr>
             <a:lvl4pPr>
-              <a:defRPr sz="2000"/>
+              <a:defRPr sz="1600"/>
             </a:lvl4pPr>
             <a:lvl5pPr>
-              <a:defRPr sz="2000"/>
+              <a:defRPr sz="1400"/>
             </a:lvl5pPr>
             <a:lvl6pPr>
               <a:defRPr sz="2000"/>
@@ -6476,7 +7059,7 @@
               <a:rPr lang="en-US" smtClean="0"/>
               <a:t>Fifth level</a:t>
             </a:r>
-            <a:endParaRPr lang="en-US"/>
+            <a:endParaRPr lang="en-US" dirty="0"/>
           </a:p>
         </p:txBody>
       </p:sp>
@@ -6492,8 +7075,8 @@
         </p:nvSpPr>
         <p:spPr>
           <a:xfrm>
-            <a:off x="457200" y="1435100"/>
-            <a:ext cx="3008313" cy="4691063"/>
+            <a:off x="1075765" y="3497802"/>
+            <a:ext cx="3388660" cy="2139518"/>
           </a:xfrm>
         </p:spPr>
         <p:txBody>
@@ -6617,11 +7200,18 @@
   <p:clrMapOvr>
     <a:masterClrMapping/>
   </p:clrMapOvr>
+  <p:timing>
+    <p:tnLst>
+      <p:par>
+        <p:cTn id="1" dur="indefinite" restart="never" nodeType="tmRoot"/>
+      </p:par>
+    </p:tnLst>
+  </p:timing>
 </p:sldLayout>
 </file>
 
 <file path=ppt/slideLayouts/slideLayout9.xml><?xml version="1.0" encoding="utf-8"?>
-<p:sldLayout xmlns:a="http://schemas.openxmlformats.org/drawingml/2006/main" xmlns:r="http://schemas.openxmlformats.org/officeDocument/2006/relationships" xmlns:p="http://schemas.openxmlformats.org/presentationml/2006/main" type="picTx" preserve="1">
+<p:sldLayout xmlns:a="http://schemas.openxmlformats.org/drawingml/2006/main" xmlns:r="http://schemas.openxmlformats.org/officeDocument/2006/relationships" xmlns:p="http://schemas.openxmlformats.org/presentationml/2006/main" showMasterSp="0" type="picTx" preserve="1">
   <p:cSld name="Picture with Caption">
     <p:spTree>
       <p:nvGrpSpPr>
@@ -6639,32 +7229,269 @@
       </p:grpSpPr>
       <p:sp>
         <p:nvSpPr>
-          <p:cNvPr id="2" name="Title 1"/>
-          <p:cNvSpPr>
-            <a:spLocks noGrp="1"/>
-          </p:cNvSpPr>
-          <p:nvPr>
-            <p:ph type="title"/>
-          </p:nvPr>
+          <p:cNvPr id="8" name="Rectangle 7"/>
+          <p:cNvSpPr/>
+          <p:nvPr/>
         </p:nvSpPr>
         <p:spPr>
           <a:xfrm>
-            <a:off x="1792288" y="4800600"/>
-            <a:ext cx="5486400" cy="566738"/>
+            <a:off x="0" y="3866920"/>
+            <a:ext cx="9144000" cy="2991080"/>
           </a:xfrm>
+          <a:prstGeom prst="rect">
+            <a:avLst/>
+          </a:prstGeom>
+          <a:gradFill>
+            <a:gsLst>
+              <a:gs pos="0">
+                <a:schemeClr val="bg1">
+                  <a:alpha val="92000"/>
+                </a:schemeClr>
+              </a:gs>
+              <a:gs pos="37000">
+                <a:schemeClr val="bg1">
+                  <a:alpha val="77000"/>
+                </a:schemeClr>
+              </a:gs>
+              <a:gs pos="100000">
+                <a:schemeClr val="bg2">
+                  <a:alpha val="80000"/>
+                </a:schemeClr>
+              </a:gs>
+            </a:gsLst>
+            <a:path path="circle">
+              <a:fillToRect l="50000" t="50000" r="50000" b="50000"/>
+            </a:path>
+          </a:gradFill>
+          <a:ln>
+            <a:noFill/>
+          </a:ln>
         </p:spPr>
+        <p:style>
+          <a:lnRef idx="2">
+            <a:schemeClr val="accent1">
+              <a:shade val="50000"/>
+            </a:schemeClr>
+          </a:lnRef>
+          <a:fillRef idx="1">
+            <a:schemeClr val="accent1"/>
+          </a:fillRef>
+          <a:effectRef idx="0">
+            <a:schemeClr val="accent1"/>
+          </a:effectRef>
+          <a:fontRef idx="minor">
+            <a:schemeClr val="lt1"/>
+          </a:fontRef>
+        </p:style>
         <p:txBody>
-          <a:bodyPr anchor="b"/>
-          <a:lstStyle>
-            <a:lvl1pPr algn="l">
-              <a:defRPr sz="2000" b="1"/>
-            </a:lvl1pPr>
-          </a:lstStyle>
-          <a:p>
-            <a:r>
-              <a:rPr lang="en-US" smtClean="0"/>
-              <a:t>Click to edit Master title style</a:t>
-            </a:r>
+          <a:bodyPr rtlCol="0" anchor="ctr"/>
+          <a:lstStyle/>
+          <a:p>
+            <a:pPr algn="ctr"/>
+            <a:endParaRPr lang="en-US"/>
+          </a:p>
+        </p:txBody>
+      </p:sp>
+      <p:sp>
+        <p:nvSpPr>
+          <p:cNvPr id="9" name="Rectangle 8"/>
+          <p:cNvSpPr/>
+          <p:nvPr/>
+        </p:nvSpPr>
+        <p:spPr>
+          <a:xfrm>
+            <a:off x="0" y="0"/>
+            <a:ext cx="9144000" cy="3866920"/>
+          </a:xfrm>
+          <a:prstGeom prst="rect">
+            <a:avLst/>
+          </a:prstGeom>
+          <a:gradFill flip="none" rotWithShape="1">
+            <a:gsLst>
+              <a:gs pos="0">
+                <a:schemeClr val="bg1">
+                  <a:alpha val="90000"/>
+                </a:schemeClr>
+              </a:gs>
+              <a:gs pos="48000">
+                <a:schemeClr val="bg1">
+                  <a:alpha val="63000"/>
+                </a:schemeClr>
+              </a:gs>
+              <a:gs pos="100000">
+                <a:schemeClr val="bg2">
+                  <a:alpha val="80000"/>
+                </a:schemeClr>
+              </a:gs>
+            </a:gsLst>
+            <a:path path="circle">
+              <a:fillToRect l="50000" t="50000" r="50000" b="50000"/>
+            </a:path>
+            <a:tileRect/>
+          </a:gradFill>
+          <a:ln>
+            <a:noFill/>
+          </a:ln>
+        </p:spPr>
+        <p:style>
+          <a:lnRef idx="2">
+            <a:schemeClr val="accent1">
+              <a:shade val="50000"/>
+            </a:schemeClr>
+          </a:lnRef>
+          <a:fillRef idx="1">
+            <a:schemeClr val="accent1"/>
+          </a:fillRef>
+          <a:effectRef idx="0">
+            <a:schemeClr val="accent1"/>
+          </a:effectRef>
+          <a:fontRef idx="minor">
+            <a:schemeClr val="lt1"/>
+          </a:fontRef>
+        </p:style>
+        <p:txBody>
+          <a:bodyPr rtlCol="0" anchor="ctr"/>
+          <a:lstStyle/>
+          <a:p>
+            <a:pPr algn="ctr"/>
+            <a:endParaRPr lang="en-US" dirty="0"/>
+          </a:p>
+        </p:txBody>
+      </p:sp>
+      <p:sp>
+        <p:nvSpPr>
+          <p:cNvPr id="10" name="Rectangle 9"/>
+          <p:cNvSpPr/>
+          <p:nvPr/>
+        </p:nvSpPr>
+        <p:spPr>
+          <a:xfrm>
+            <a:off x="0" y="2652311"/>
+            <a:ext cx="9144000" cy="2286000"/>
+          </a:xfrm>
+          <a:prstGeom prst="rect">
+            <a:avLst/>
+          </a:prstGeom>
+          <a:gradFill flip="none" rotWithShape="1">
+            <a:gsLst>
+              <a:gs pos="0">
+                <a:schemeClr val="bg1">
+                  <a:alpha val="0"/>
+                </a:schemeClr>
+              </a:gs>
+              <a:gs pos="29000">
+                <a:schemeClr val="bg1">
+                  <a:alpha val="30000"/>
+                </a:schemeClr>
+              </a:gs>
+              <a:gs pos="45000">
+                <a:schemeClr val="bg2">
+                  <a:alpha val="40000"/>
+                </a:schemeClr>
+              </a:gs>
+              <a:gs pos="55000">
+                <a:schemeClr val="bg1">
+                  <a:alpha val="26000"/>
+                </a:schemeClr>
+              </a:gs>
+              <a:gs pos="65000">
+                <a:schemeClr val="bg2">
+                  <a:alpha val="60000"/>
+                </a:schemeClr>
+              </a:gs>
+              <a:gs pos="100000">
+                <a:schemeClr val="bg1">
+                  <a:alpha val="0"/>
+                </a:schemeClr>
+              </a:gs>
+            </a:gsLst>
+            <a:lin ang="5400000" scaled="0"/>
+            <a:tileRect/>
+          </a:gradFill>
+          <a:ln>
+            <a:noFill/>
+          </a:ln>
+        </p:spPr>
+        <p:style>
+          <a:lnRef idx="2">
+            <a:schemeClr val="accent1">
+              <a:shade val="50000"/>
+            </a:schemeClr>
+          </a:lnRef>
+          <a:fillRef idx="1">
+            <a:schemeClr val="accent1"/>
+          </a:fillRef>
+          <a:effectRef idx="0">
+            <a:schemeClr val="accent1"/>
+          </a:effectRef>
+          <a:fontRef idx="minor">
+            <a:schemeClr val="lt1"/>
+          </a:fontRef>
+        </p:style>
+        <p:txBody>
+          <a:bodyPr rtlCol="0" anchor="ctr"/>
+          <a:lstStyle/>
+          <a:p>
+            <a:pPr algn="ctr"/>
+            <a:endParaRPr lang="en-US"/>
+          </a:p>
+        </p:txBody>
+      </p:sp>
+      <p:sp>
+        <p:nvSpPr>
+          <p:cNvPr id="11" name="Oval 10"/>
+          <p:cNvSpPr/>
+          <p:nvPr/>
+        </p:nvSpPr>
+        <p:spPr>
+          <a:xfrm>
+            <a:off x="0" y="1600200"/>
+            <a:ext cx="9144000" cy="5105400"/>
+          </a:xfrm>
+          <a:prstGeom prst="ellipse">
+            <a:avLst/>
+          </a:prstGeom>
+          <a:gradFill flip="none" rotWithShape="1">
+            <a:gsLst>
+              <a:gs pos="0">
+                <a:schemeClr val="bg1"/>
+              </a:gs>
+              <a:gs pos="54000">
+                <a:schemeClr val="bg1">
+                  <a:alpha val="0"/>
+                </a:schemeClr>
+              </a:gs>
+            </a:gsLst>
+            <a:path path="circle">
+              <a:fillToRect l="50000" t="50000" r="50000" b="50000"/>
+            </a:path>
+            <a:tileRect/>
+          </a:gradFill>
+          <a:ln>
+            <a:noFill/>
+          </a:ln>
+        </p:spPr>
+        <p:style>
+          <a:lnRef idx="2">
+            <a:schemeClr val="accent1">
+              <a:shade val="50000"/>
+            </a:schemeClr>
+          </a:lnRef>
+          <a:fillRef idx="1">
+            <a:schemeClr val="accent1"/>
+          </a:fillRef>
+          <a:effectRef idx="0">
+            <a:schemeClr val="accent1"/>
+          </a:effectRef>
+          <a:fontRef idx="minor">
+            <a:schemeClr val="lt1"/>
+          </a:fontRef>
+        </p:style>
+        <p:txBody>
+          <a:bodyPr rtlCol="0" anchor="ctr"/>
+          <a:lstStyle/>
+          <a:p>
+            <a:pPr algn="ctr"/>
             <a:endParaRPr lang="en-US"/>
           </a:p>
         </p:txBody>
@@ -6681,16 +7508,41 @@
         </p:nvSpPr>
         <p:spPr>
           <a:xfrm>
-            <a:off x="1792288" y="612775"/>
-            <a:ext cx="5486400" cy="4114800"/>
+            <a:off x="4475175" y="1143000"/>
+            <a:ext cx="4114800" cy="3127806"/>
           </a:xfrm>
+          <a:prstGeom prst="roundRect">
+            <a:avLst>
+              <a:gd name="adj" fmla="val 4230"/>
+            </a:avLst>
+          </a:prstGeom>
+          <a:solidFill>
+            <a:schemeClr val="bg2">
+              <a:lumMod val="90000"/>
+            </a:schemeClr>
+          </a:solidFill>
+          <a:effectLst>
+            <a:reflection blurRad="4350" stA="23000" endA="300" endPos="28000" dir="5400000" sy="-100000" algn="bl" rotWithShape="0"/>
+          </a:effectLst>
+          <a:scene3d>
+            <a:camera prst="perspectiveContrastingLeftFacing" fov="1800000">
+              <a:rot lat="300000" lon="2100000" rev="0"/>
+            </a:camera>
+            <a:lightRig rig="balanced" dir="t"/>
+          </a:scene3d>
+          <a:sp3d>
+            <a:bevelT w="50800" h="50800"/>
+          </a:sp3d>
         </p:spPr>
         <p:txBody>
-          <a:bodyPr/>
+          <a:bodyPr>
+            <a:normAutofit/>
+            <a:flatTx/>
+          </a:bodyPr>
           <a:lstStyle>
-            <a:lvl1pPr marL="0" indent="0">
+            <a:lvl1pPr marL="0" indent="0" algn="ctr">
               <a:buNone/>
-              <a:defRPr sz="3200"/>
+              <a:defRPr sz="2000"/>
             </a:lvl1pPr>
             <a:lvl2pPr marL="457200" indent="0">
               <a:buNone/>
@@ -6726,7 +7578,11 @@
             </a:lvl9pPr>
           </a:lstStyle>
           <a:p>
-            <a:endParaRPr lang="en-US"/>
+            <a:r>
+              <a:rPr lang="en-US" smtClean="0"/>
+              <a:t>Click icon to add picture</a:t>
+            </a:r>
+            <a:endParaRPr lang="en-US" dirty="0"/>
           </a:p>
         </p:txBody>
       </p:sp>
@@ -6742,16 +7598,17 @@
         </p:nvSpPr>
         <p:spPr>
           <a:xfrm>
-            <a:off x="1792288" y="5367338"/>
-            <a:ext cx="5486400" cy="804862"/>
+            <a:off x="877887" y="1010486"/>
+            <a:ext cx="3694114" cy="2163020"/>
           </a:xfrm>
         </p:spPr>
         <p:txBody>
-          <a:bodyPr/>
+          <a:bodyPr anchor="b"/>
           <a:lstStyle>
-            <a:lvl1pPr marL="0" indent="0">
-              <a:buNone/>
-              <a:defRPr sz="1400"/>
+            <a:lvl1pPr marL="182880" indent="-182880">
+              <a:buFont typeface="Georgia" pitchFamily="18" charset="0"/>
+              <a:buChar char="*"/>
+              <a:defRPr sz="1600"/>
             </a:lvl1pPr>
             <a:lvl2pPr marL="457200" indent="0">
               <a:buNone/>
@@ -6862,11 +7719,52 @@
           </a:p>
         </p:txBody>
       </p:sp>
+      <p:sp>
+        <p:nvSpPr>
+          <p:cNvPr id="2" name="Title 1"/>
+          <p:cNvSpPr>
+            <a:spLocks noGrp="1"/>
+          </p:cNvSpPr>
+          <p:nvPr>
+            <p:ph type="title"/>
+          </p:nvPr>
+        </p:nvSpPr>
+        <p:spPr>
+          <a:xfrm>
+            <a:off x="727268" y="4464421"/>
+            <a:ext cx="6383538" cy="1143000"/>
+          </a:xfrm>
+        </p:spPr>
+        <p:txBody>
+          <a:bodyPr anchor="b">
+            <a:noAutofit/>
+          </a:bodyPr>
+          <a:lstStyle>
+            <a:lvl1pPr algn="l">
+              <a:defRPr sz="4600" b="1"/>
+            </a:lvl1pPr>
+          </a:lstStyle>
+          <a:p>
+            <a:r>
+              <a:rPr lang="en-US" smtClean="0"/>
+              <a:t>Click to edit Master title style</a:t>
+            </a:r>
+            <a:endParaRPr lang="en-US" dirty="0"/>
+          </a:p>
+        </p:txBody>
+      </p:sp>
     </p:spTree>
   </p:cSld>
   <p:clrMapOvr>
     <a:masterClrMapping/>
   </p:clrMapOvr>
+  <p:timing>
+    <p:tnLst>
+      <p:par>
+        <p:cTn id="1" dur="indefinite" restart="never" nodeType="tmRoot"/>
+      </p:par>
+    </p:tnLst>
+  </p:timing>
 </p:sldLayout>
 </file>
 
@@ -6874,8 +7772,8 @@
 <p:sldMaster xmlns:a="http://schemas.openxmlformats.org/drawingml/2006/main" xmlns:r="http://schemas.openxmlformats.org/officeDocument/2006/relationships" xmlns:p="http://schemas.openxmlformats.org/presentationml/2006/main">
   <p:cSld>
     <p:bg>
-      <p:bgRef idx="1001">
-        <a:schemeClr val="bg1"/>
+      <p:bgRef idx="1002">
+        <a:schemeClr val="bg2"/>
       </p:bgRef>
     </p:bg>
     <p:spTree>
@@ -6894,6 +7792,275 @@
       </p:grpSpPr>
       <p:sp>
         <p:nvSpPr>
+          <p:cNvPr id="7" name="Rectangle 6"/>
+          <p:cNvSpPr/>
+          <p:nvPr/>
+        </p:nvSpPr>
+        <p:spPr>
+          <a:xfrm>
+            <a:off x="0" y="5105400"/>
+            <a:ext cx="9144000" cy="1752600"/>
+          </a:xfrm>
+          <a:prstGeom prst="rect">
+            <a:avLst/>
+          </a:prstGeom>
+          <a:gradFill>
+            <a:gsLst>
+              <a:gs pos="0">
+                <a:schemeClr val="bg1">
+                  <a:alpha val="91000"/>
+                </a:schemeClr>
+              </a:gs>
+              <a:gs pos="37000">
+                <a:schemeClr val="bg1">
+                  <a:alpha val="76000"/>
+                </a:schemeClr>
+              </a:gs>
+              <a:gs pos="100000">
+                <a:schemeClr val="bg2">
+                  <a:alpha val="79000"/>
+                </a:schemeClr>
+              </a:gs>
+            </a:gsLst>
+            <a:path path="circle">
+              <a:fillToRect l="50000" t="50000" r="50000" b="50000"/>
+            </a:path>
+          </a:gradFill>
+          <a:ln>
+            <a:noFill/>
+          </a:ln>
+        </p:spPr>
+        <p:style>
+          <a:lnRef idx="2">
+            <a:schemeClr val="accent1">
+              <a:shade val="50000"/>
+            </a:schemeClr>
+          </a:lnRef>
+          <a:fillRef idx="1">
+            <a:schemeClr val="accent1"/>
+          </a:fillRef>
+          <a:effectRef idx="0">
+            <a:schemeClr val="accent1"/>
+          </a:effectRef>
+          <a:fontRef idx="minor">
+            <a:schemeClr val="lt1"/>
+          </a:fontRef>
+        </p:style>
+        <p:txBody>
+          <a:bodyPr rtlCol="0" anchor="ctr"/>
+          <a:lstStyle/>
+          <a:p>
+            <a:pPr algn="ctr"/>
+            <a:endParaRPr lang="en-US"/>
+          </a:p>
+        </p:txBody>
+      </p:sp>
+      <p:sp>
+        <p:nvSpPr>
+          <p:cNvPr id="8" name="Rectangle 7"/>
+          <p:cNvSpPr/>
+          <p:nvPr/>
+        </p:nvSpPr>
+        <p:spPr>
+          <a:xfrm>
+            <a:off x="0" y="0"/>
+            <a:ext cx="9144000" cy="5105400"/>
+          </a:xfrm>
+          <a:prstGeom prst="rect">
+            <a:avLst/>
+          </a:prstGeom>
+          <a:gradFill flip="none" rotWithShape="1">
+            <a:gsLst>
+              <a:gs pos="0">
+                <a:schemeClr val="bg1">
+                  <a:alpha val="89000"/>
+                </a:schemeClr>
+              </a:gs>
+              <a:gs pos="48000">
+                <a:schemeClr val="bg1">
+                  <a:alpha val="62000"/>
+                </a:schemeClr>
+              </a:gs>
+              <a:gs pos="100000">
+                <a:schemeClr val="bg2">
+                  <a:alpha val="79000"/>
+                </a:schemeClr>
+              </a:gs>
+            </a:gsLst>
+            <a:path path="circle">
+              <a:fillToRect l="50000" t="50000" r="50000" b="50000"/>
+            </a:path>
+            <a:tileRect/>
+          </a:gradFill>
+          <a:ln>
+            <a:noFill/>
+          </a:ln>
+        </p:spPr>
+        <p:style>
+          <a:lnRef idx="2">
+            <a:schemeClr val="accent1">
+              <a:shade val="50000"/>
+            </a:schemeClr>
+          </a:lnRef>
+          <a:fillRef idx="1">
+            <a:schemeClr val="accent1"/>
+          </a:fillRef>
+          <a:effectRef idx="0">
+            <a:schemeClr val="accent1"/>
+          </a:effectRef>
+          <a:fontRef idx="minor">
+            <a:schemeClr val="lt1"/>
+          </a:fontRef>
+        </p:style>
+        <p:txBody>
+          <a:bodyPr rtlCol="0" anchor="ctr"/>
+          <a:lstStyle/>
+          <a:p>
+            <a:pPr algn="ctr"/>
+            <a:endParaRPr lang="en-US" dirty="0"/>
+          </a:p>
+        </p:txBody>
+      </p:sp>
+      <p:sp>
+        <p:nvSpPr>
+          <p:cNvPr id="9" name="Rectangle 8"/>
+          <p:cNvSpPr/>
+          <p:nvPr/>
+        </p:nvSpPr>
+        <p:spPr>
+          <a:xfrm>
+            <a:off x="0" y="3768304"/>
+            <a:ext cx="9144000" cy="2286000"/>
+          </a:xfrm>
+          <a:prstGeom prst="rect">
+            <a:avLst/>
+          </a:prstGeom>
+          <a:gradFill flip="none" rotWithShape="1">
+            <a:gsLst>
+              <a:gs pos="0">
+                <a:schemeClr val="bg1">
+                  <a:alpha val="0"/>
+                </a:schemeClr>
+              </a:gs>
+              <a:gs pos="29000">
+                <a:schemeClr val="bg1">
+                  <a:alpha val="30000"/>
+                </a:schemeClr>
+              </a:gs>
+              <a:gs pos="45000">
+                <a:schemeClr val="bg2">
+                  <a:alpha val="40000"/>
+                </a:schemeClr>
+              </a:gs>
+              <a:gs pos="55000">
+                <a:schemeClr val="bg1">
+                  <a:alpha val="26000"/>
+                </a:schemeClr>
+              </a:gs>
+              <a:gs pos="65000">
+                <a:schemeClr val="bg2">
+                  <a:alpha val="60000"/>
+                </a:schemeClr>
+              </a:gs>
+              <a:gs pos="100000">
+                <a:schemeClr val="bg1">
+                  <a:alpha val="0"/>
+                </a:schemeClr>
+              </a:gs>
+            </a:gsLst>
+            <a:lin ang="5400000" scaled="0"/>
+            <a:tileRect/>
+          </a:gradFill>
+          <a:ln>
+            <a:noFill/>
+          </a:ln>
+        </p:spPr>
+        <p:style>
+          <a:lnRef idx="2">
+            <a:schemeClr val="accent1">
+              <a:shade val="50000"/>
+            </a:schemeClr>
+          </a:lnRef>
+          <a:fillRef idx="1">
+            <a:schemeClr val="accent1"/>
+          </a:fillRef>
+          <a:effectRef idx="0">
+            <a:schemeClr val="accent1"/>
+          </a:effectRef>
+          <a:fontRef idx="minor">
+            <a:schemeClr val="lt1"/>
+          </a:fontRef>
+        </p:style>
+        <p:txBody>
+          <a:bodyPr rtlCol="0" anchor="ctr"/>
+          <a:lstStyle/>
+          <a:p>
+            <a:pPr algn="ctr"/>
+            <a:endParaRPr lang="en-US"/>
+          </a:p>
+        </p:txBody>
+      </p:sp>
+      <p:sp>
+        <p:nvSpPr>
+          <p:cNvPr id="10" name="Oval 9"/>
+          <p:cNvSpPr/>
+          <p:nvPr/>
+        </p:nvSpPr>
+        <p:spPr>
+          <a:xfrm>
+            <a:off x="0" y="1600200"/>
+            <a:ext cx="9144000" cy="5105400"/>
+          </a:xfrm>
+          <a:prstGeom prst="ellipse">
+            <a:avLst/>
+          </a:prstGeom>
+          <a:gradFill flip="none" rotWithShape="1">
+            <a:gsLst>
+              <a:gs pos="0">
+                <a:schemeClr val="bg1"/>
+              </a:gs>
+              <a:gs pos="56000">
+                <a:schemeClr val="bg1">
+                  <a:alpha val="0"/>
+                </a:schemeClr>
+              </a:gs>
+            </a:gsLst>
+            <a:path path="circle">
+              <a:fillToRect l="50000" t="50000" r="50000" b="50000"/>
+            </a:path>
+            <a:tileRect/>
+          </a:gradFill>
+          <a:ln>
+            <a:noFill/>
+          </a:ln>
+        </p:spPr>
+        <p:style>
+          <a:lnRef idx="2">
+            <a:schemeClr val="accent1">
+              <a:shade val="50000"/>
+            </a:schemeClr>
+          </a:lnRef>
+          <a:fillRef idx="1">
+            <a:schemeClr val="accent1"/>
+          </a:fillRef>
+          <a:effectRef idx="0">
+            <a:schemeClr val="accent1"/>
+          </a:effectRef>
+          <a:fontRef idx="minor">
+            <a:schemeClr val="lt1"/>
+          </a:fontRef>
+        </p:style>
+        <p:txBody>
+          <a:bodyPr rtlCol="0" anchor="ctr"/>
+          <a:lstStyle/>
+          <a:p>
+            <a:pPr algn="ctr"/>
+            <a:endParaRPr lang="en-US"/>
+          </a:p>
+        </p:txBody>
+      </p:sp>
+      <p:sp>
+        <p:nvSpPr>
           <p:cNvPr id="2" name="Title Placeholder 1"/>
           <p:cNvSpPr>
             <a:spLocks noGrp="1"/>
@@ -6904,16 +8071,17 @@
         </p:nvSpPr>
         <p:spPr>
           <a:xfrm>
-            <a:off x="457200" y="274638"/>
-            <a:ext cx="8229600" cy="1143000"/>
+            <a:off x="1793289" y="4372168"/>
+            <a:ext cx="6512511" cy="1143000"/>
           </a:xfrm>
           <a:prstGeom prst="rect">
             <a:avLst/>
           </a:prstGeom>
+          <a:effectLst/>
         </p:spPr>
         <p:txBody>
-          <a:bodyPr vert="horz" lIns="91440" tIns="45720" rIns="91440" bIns="45720" rtlCol="0" anchor="ctr">
-            <a:normAutofit/>
+          <a:bodyPr vert="horz" lIns="91440" tIns="45720" rIns="91440" bIns="45720" rtlCol="0" anchor="t" anchorCtr="0">
+            <a:noAutofit/>
           </a:bodyPr>
           <a:lstStyle/>
           <a:p>
@@ -6921,7 +8089,7 @@
               <a:rPr lang="en-US" smtClean="0"/>
               <a:t>Click to edit Master title style</a:t>
             </a:r>
-            <a:endParaRPr lang="en-US"/>
+            <a:endParaRPr lang="en-US" dirty="0"/>
           </a:p>
         </p:txBody>
       </p:sp>
@@ -6937,8 +8105,8 @@
         </p:nvSpPr>
         <p:spPr>
           <a:xfrm>
-            <a:off x="457200" y="1600200"/>
-            <a:ext cx="8229600" cy="4525963"/>
+            <a:off x="1143000" y="732260"/>
+            <a:ext cx="6400800" cy="3474720"/>
           </a:xfrm>
           <a:prstGeom prst="rect">
             <a:avLst/>
@@ -6983,7 +8151,7 @@
               <a:rPr lang="en-US" smtClean="0"/>
               <a:t>Fifth level</a:t>
             </a:r>
-            <a:endParaRPr lang="en-US"/>
+            <a:endParaRPr lang="en-US" dirty="0"/>
           </a:p>
         </p:txBody>
       </p:sp>
@@ -6999,8 +8167,8 @@
         </p:nvSpPr>
         <p:spPr>
           <a:xfrm>
-            <a:off x="457200" y="6356350"/>
-            <a:ext cx="2133600" cy="365125"/>
+            <a:off x="6172200" y="6172200"/>
+            <a:ext cx="2514600" cy="365125"/>
           </a:xfrm>
           <a:prstGeom prst="rect">
             <a:avLst/>
@@ -7009,11 +8177,12 @@
         <p:txBody>
           <a:bodyPr vert="horz" lIns="91440" tIns="45720" rIns="91440" bIns="45720" rtlCol="0" anchor="ctr"/>
           <a:lstStyle>
-            <a:lvl1pPr algn="l">
-              <a:defRPr sz="1200">
+            <a:lvl1pPr algn="r">
+              <a:defRPr sz="1100" b="1">
                 <a:solidFill>
                   <a:schemeClr val="tx1">
-                    <a:tint val="75000"/>
+                    <a:lumMod val="50000"/>
+                    <a:lumOff val="50000"/>
                   </a:schemeClr>
                 </a:solidFill>
               </a:defRPr>
@@ -7041,8 +8210,8 @@
         </p:nvSpPr>
         <p:spPr>
           <a:xfrm>
-            <a:off x="3124200" y="6356350"/>
-            <a:ext cx="2895600" cy="365125"/>
+            <a:off x="457199" y="6172200"/>
+            <a:ext cx="3352801" cy="365125"/>
           </a:xfrm>
           <a:prstGeom prst="rect">
             <a:avLst/>
@@ -7051,11 +8220,12 @@
         <p:txBody>
           <a:bodyPr vert="horz" lIns="91440" tIns="45720" rIns="91440" bIns="45720" rtlCol="0" anchor="ctr"/>
           <a:lstStyle>
-            <a:lvl1pPr algn="ctr">
-              <a:defRPr sz="1200">
+            <a:lvl1pPr algn="l">
+              <a:defRPr sz="1100" b="1">
                 <a:solidFill>
                   <a:schemeClr val="tx1">
-                    <a:tint val="75000"/>
+                    <a:lumMod val="50000"/>
+                    <a:lumOff val="50000"/>
                   </a:schemeClr>
                 </a:solidFill>
               </a:defRPr>
@@ -7078,8 +8248,8 @@
         </p:nvSpPr>
         <p:spPr>
           <a:xfrm>
-            <a:off x="6553200" y="6356350"/>
-            <a:ext cx="2133600" cy="365125"/>
+            <a:off x="3810000" y="6172200"/>
+            <a:ext cx="1828800" cy="365125"/>
           </a:xfrm>
           <a:prstGeom prst="rect">
             <a:avLst/>
@@ -7088,11 +8258,12 @@
         <p:txBody>
           <a:bodyPr vert="horz" lIns="91440" tIns="45720" rIns="91440" bIns="45720" rtlCol="0" anchor="ctr"/>
           <a:lstStyle>
-            <a:lvl1pPr algn="r">
-              <a:defRPr sz="1200">
+            <a:lvl1pPr algn="ctr">
+              <a:defRPr sz="1200" b="1">
                 <a:solidFill>
                   <a:schemeClr val="tx1">
-                    <a:tint val="75000"/>
+                    <a:lumMod val="50000"/>
+                    <a:lumOff val="50000"/>
                   </a:schemeClr>
                 </a:solidFill>
               </a:defRPr>
@@ -7112,165 +8283,362 @@
   </p:cSld>
   <p:clrMap bg1="lt1" tx1="dk1" bg2="lt2" tx2="dk2" accent1="accent1" accent2="accent2" accent3="accent3" accent4="accent4" accent5="accent5" accent6="accent6" hlink="hlink" folHlink="folHlink"/>
   <p:sldLayoutIdLst>
-    <p:sldLayoutId id="2147483649" r:id="rId1"/>
-    <p:sldLayoutId id="2147483650" r:id="rId2"/>
-    <p:sldLayoutId id="2147483651" r:id="rId3"/>
-    <p:sldLayoutId id="2147483652" r:id="rId4"/>
-    <p:sldLayoutId id="2147483653" r:id="rId5"/>
-    <p:sldLayoutId id="2147483654" r:id="rId6"/>
-    <p:sldLayoutId id="2147483655" r:id="rId7"/>
-    <p:sldLayoutId id="2147483656" r:id="rId8"/>
-    <p:sldLayoutId id="2147483657" r:id="rId9"/>
-    <p:sldLayoutId id="2147483658" r:id="rId10"/>
-    <p:sldLayoutId id="2147483659" r:id="rId11"/>
+    <p:sldLayoutId id="2147483673" r:id="rId1"/>
+    <p:sldLayoutId id="2147483674" r:id="rId2"/>
+    <p:sldLayoutId id="2147483675" r:id="rId3"/>
+    <p:sldLayoutId id="2147483676" r:id="rId4"/>
+    <p:sldLayoutId id="2147483677" r:id="rId5"/>
+    <p:sldLayoutId id="2147483678" r:id="rId6"/>
+    <p:sldLayoutId id="2147483679" r:id="rId7"/>
+    <p:sldLayoutId id="2147483680" r:id="rId8"/>
+    <p:sldLayoutId id="2147483681" r:id="rId9"/>
+    <p:sldLayoutId id="2147483682" r:id="rId10"/>
+    <p:sldLayoutId id="2147483683" r:id="rId11"/>
   </p:sldLayoutIdLst>
+  <p:timing>
+    <p:tnLst>
+      <p:par>
+        <p:cTn id="1" dur="indefinite" restart="never" nodeType="tmRoot"/>
+      </p:par>
+    </p:tnLst>
+  </p:timing>
   <p:txStyles>
     <p:titleStyle>
-      <a:lvl1pPr algn="ctr" defTabSz="914400" rtl="0" eaLnBrk="1" latinLnBrk="0" hangingPunct="1">
+      <a:lvl1pPr marL="320040" indent="-320040" algn="r" defTabSz="914400" rtl="0" eaLnBrk="1" latinLnBrk="0" hangingPunct="1">
         <a:spcBef>
           <a:spcPct val="0"/>
         </a:spcBef>
-        <a:buNone/>
-        <a:defRPr sz="4400" kern="1200">
-          <a:solidFill>
-            <a:schemeClr val="tx1"/>
-          </a:solidFill>
+        <a:buClr>
+          <a:schemeClr val="accent6">
+            <a:lumMod val="75000"/>
+          </a:schemeClr>
+        </a:buClr>
+        <a:buSzPct val="128000"/>
+        <a:buFont typeface="Georgia" pitchFamily="18" charset="0"/>
+        <a:buChar char="*"/>
+        <a:defRPr sz="4600" b="1" i="0" kern="1200">
+          <a:gradFill>
+            <a:gsLst>
+              <a:gs pos="0">
+                <a:schemeClr val="tx1"/>
+              </a:gs>
+              <a:gs pos="40000">
+                <a:schemeClr val="tx1">
+                  <a:lumMod val="75000"/>
+                  <a:lumOff val="25000"/>
+                </a:schemeClr>
+              </a:gs>
+              <a:gs pos="100000">
+                <a:schemeClr val="tx2">
+                  <a:alpha val="65000"/>
+                </a:schemeClr>
+              </a:gs>
+            </a:gsLst>
+            <a:lin ang="5400000" scaled="0"/>
+          </a:gradFill>
+          <a:effectLst>
+            <a:reflection blurRad="6350" stA="55000" endA="300" endPos="45500" dir="5400000" sy="-100000" algn="bl" rotWithShape="0"/>
+          </a:effectLst>
           <a:latin typeface="+mj-lt"/>
           <a:ea typeface="+mj-ea"/>
           <a:cs typeface="+mj-cs"/>
         </a:defRPr>
       </a:lvl1pPr>
+      <a:lvl2pPr eaLnBrk="1" hangingPunct="1">
+        <a:defRPr>
+          <a:solidFill>
+            <a:schemeClr val="tx2"/>
+          </a:solidFill>
+        </a:defRPr>
+      </a:lvl2pPr>
+      <a:lvl3pPr eaLnBrk="1" hangingPunct="1">
+        <a:defRPr>
+          <a:solidFill>
+            <a:schemeClr val="tx2"/>
+          </a:solidFill>
+        </a:defRPr>
+      </a:lvl3pPr>
+      <a:lvl4pPr eaLnBrk="1" hangingPunct="1">
+        <a:defRPr>
+          <a:solidFill>
+            <a:schemeClr val="tx2"/>
+          </a:solidFill>
+        </a:defRPr>
+      </a:lvl4pPr>
+      <a:lvl5pPr eaLnBrk="1" hangingPunct="1">
+        <a:defRPr>
+          <a:solidFill>
+            <a:schemeClr val="tx2"/>
+          </a:solidFill>
+        </a:defRPr>
+      </a:lvl5pPr>
+      <a:lvl6pPr eaLnBrk="1" hangingPunct="1">
+        <a:defRPr>
+          <a:solidFill>
+            <a:schemeClr val="tx2"/>
+          </a:solidFill>
+        </a:defRPr>
+      </a:lvl6pPr>
+      <a:lvl7pPr eaLnBrk="1" hangingPunct="1">
+        <a:defRPr>
+          <a:solidFill>
+            <a:schemeClr val="tx2"/>
+          </a:solidFill>
+        </a:defRPr>
+      </a:lvl7pPr>
+      <a:lvl8pPr eaLnBrk="1" hangingPunct="1">
+        <a:defRPr>
+          <a:solidFill>
+            <a:schemeClr val="tx2"/>
+          </a:solidFill>
+        </a:defRPr>
+      </a:lvl8pPr>
+      <a:lvl9pPr eaLnBrk="1" hangingPunct="1">
+        <a:defRPr>
+          <a:solidFill>
+            <a:schemeClr val="tx2"/>
+          </a:solidFill>
+        </a:defRPr>
+      </a:lvl9pPr>
     </p:titleStyle>
     <p:bodyStyle>
-      <a:lvl1pPr marL="342900" indent="-342900" algn="l" defTabSz="914400" rtl="0" eaLnBrk="1" latinLnBrk="0" hangingPunct="1">
+      <a:lvl1pPr marL="228600" indent="-182880" algn="l" defTabSz="914400" rtl="0" eaLnBrk="1" latinLnBrk="0" hangingPunct="1">
         <a:spcBef>
           <a:spcPct val="20000"/>
         </a:spcBef>
-        <a:buFont typeface="Arial" pitchFamily="34" charset="0"/>
-        <a:buChar char="•"/>
-        <a:defRPr sz="3200" kern="1200">
+        <a:spcAft>
+          <a:spcPts val="300"/>
+        </a:spcAft>
+        <a:buClr>
+          <a:schemeClr val="accent6">
+            <a:lumMod val="75000"/>
+          </a:schemeClr>
+        </a:buClr>
+        <a:buSzPct val="130000"/>
+        <a:buFont typeface="Georgia" pitchFamily="18" charset="0"/>
+        <a:buChar char="*"/>
+        <a:defRPr sz="2200" kern="1200">
           <a:solidFill>
-            <a:schemeClr val="tx1"/>
+            <a:schemeClr val="tx1">
+              <a:lumMod val="75000"/>
+              <a:lumOff val="25000"/>
+            </a:schemeClr>
           </a:solidFill>
           <a:latin typeface="+mn-lt"/>
           <a:ea typeface="+mn-ea"/>
           <a:cs typeface="+mn-cs"/>
         </a:defRPr>
       </a:lvl1pPr>
-      <a:lvl2pPr marL="742950" indent="-285750" algn="l" defTabSz="914400" rtl="0" eaLnBrk="1" latinLnBrk="0" hangingPunct="1">
+      <a:lvl2pPr marL="548640" indent="-182880" algn="l" defTabSz="914400" rtl="0" eaLnBrk="1" latinLnBrk="0" hangingPunct="1">
         <a:spcBef>
           <a:spcPct val="20000"/>
         </a:spcBef>
-        <a:buFont typeface="Arial" pitchFamily="34" charset="0"/>
-        <a:buChar char="–"/>
-        <a:defRPr sz="2800" kern="1200">
+        <a:spcAft>
+          <a:spcPts val="300"/>
+        </a:spcAft>
+        <a:buClr>
+          <a:schemeClr val="accent6">
+            <a:lumMod val="75000"/>
+          </a:schemeClr>
+        </a:buClr>
+        <a:buSzPct val="130000"/>
+        <a:buFont typeface="Georgia" pitchFamily="18" charset="0"/>
+        <a:buChar char="*"/>
+        <a:defRPr sz="2000" kern="1200">
           <a:solidFill>
-            <a:schemeClr val="tx1"/>
+            <a:schemeClr val="tx1">
+              <a:lumMod val="75000"/>
+              <a:lumOff val="25000"/>
+            </a:schemeClr>
           </a:solidFill>
           <a:latin typeface="+mn-lt"/>
           <a:ea typeface="+mn-ea"/>
           <a:cs typeface="+mn-cs"/>
         </a:defRPr>
       </a:lvl2pPr>
-      <a:lvl3pPr marL="1143000" indent="-228600" algn="l" defTabSz="914400" rtl="0" eaLnBrk="1" latinLnBrk="0" hangingPunct="1">
+      <a:lvl3pPr marL="822960" indent="-182880" algn="l" defTabSz="914400" rtl="0" eaLnBrk="1" latinLnBrk="0" hangingPunct="1">
         <a:spcBef>
           <a:spcPct val="20000"/>
         </a:spcBef>
-        <a:buFont typeface="Arial" pitchFamily="34" charset="0"/>
-        <a:buChar char="•"/>
-        <a:defRPr sz="2400" kern="1200">
+        <a:spcAft>
+          <a:spcPts val="300"/>
+        </a:spcAft>
+        <a:buClr>
+          <a:schemeClr val="accent6">
+            <a:lumMod val="75000"/>
+          </a:schemeClr>
+        </a:buClr>
+        <a:buSzPct val="130000"/>
+        <a:buFont typeface="Georgia" pitchFamily="18" charset="0"/>
+        <a:buChar char="*"/>
+        <a:defRPr sz="1800" kern="1200">
           <a:solidFill>
-            <a:schemeClr val="tx1"/>
+            <a:schemeClr val="tx1">
+              <a:lumMod val="75000"/>
+              <a:lumOff val="25000"/>
+            </a:schemeClr>
           </a:solidFill>
           <a:latin typeface="+mn-lt"/>
           <a:ea typeface="+mn-ea"/>
           <a:cs typeface="+mn-cs"/>
         </a:defRPr>
       </a:lvl3pPr>
-      <a:lvl4pPr marL="1600200" indent="-228600" algn="l" defTabSz="914400" rtl="0" eaLnBrk="1" latinLnBrk="0" hangingPunct="1">
+      <a:lvl4pPr marL="1097280" indent="-182880" algn="l" defTabSz="914400" rtl="0" eaLnBrk="1" latinLnBrk="0" hangingPunct="1">
         <a:spcBef>
           <a:spcPct val="20000"/>
         </a:spcBef>
-        <a:buFont typeface="Arial" pitchFamily="34" charset="0"/>
-        <a:buChar char="–"/>
-        <a:defRPr sz="2000" kern="1200">
+        <a:spcAft>
+          <a:spcPts val="300"/>
+        </a:spcAft>
+        <a:buClr>
+          <a:schemeClr val="accent6">
+            <a:lumMod val="75000"/>
+          </a:schemeClr>
+        </a:buClr>
+        <a:buSzPct val="130000"/>
+        <a:buFont typeface="Georgia" pitchFamily="18" charset="0"/>
+        <a:buChar char="*"/>
+        <a:defRPr sz="1600" kern="1200">
           <a:solidFill>
-            <a:schemeClr val="tx1"/>
+            <a:schemeClr val="tx1">
+              <a:lumMod val="75000"/>
+              <a:lumOff val="25000"/>
+            </a:schemeClr>
           </a:solidFill>
           <a:latin typeface="+mn-lt"/>
           <a:ea typeface="+mn-ea"/>
           <a:cs typeface="+mn-cs"/>
         </a:defRPr>
       </a:lvl4pPr>
-      <a:lvl5pPr marL="2057400" indent="-228600" algn="l" defTabSz="914400" rtl="0" eaLnBrk="1" latinLnBrk="0" hangingPunct="1">
+      <a:lvl5pPr marL="1389888" indent="-182880" algn="l" defTabSz="914400" rtl="0" eaLnBrk="1" latinLnBrk="0" hangingPunct="1">
         <a:spcBef>
           <a:spcPct val="20000"/>
         </a:spcBef>
-        <a:buFont typeface="Arial" pitchFamily="34" charset="0"/>
-        <a:buChar char="»"/>
-        <a:defRPr sz="2000" kern="1200">
+        <a:spcAft>
+          <a:spcPts val="300"/>
+        </a:spcAft>
+        <a:buClr>
+          <a:schemeClr val="accent6">
+            <a:lumMod val="75000"/>
+          </a:schemeClr>
+        </a:buClr>
+        <a:buSzPct val="130000"/>
+        <a:buFont typeface="Georgia" pitchFamily="18" charset="0"/>
+        <a:buChar char="*"/>
+        <a:defRPr sz="1400" kern="1200">
           <a:solidFill>
-            <a:schemeClr val="tx1"/>
+            <a:schemeClr val="tx1">
+              <a:lumMod val="75000"/>
+              <a:lumOff val="25000"/>
+            </a:schemeClr>
           </a:solidFill>
           <a:latin typeface="+mn-lt"/>
           <a:ea typeface="+mn-ea"/>
           <a:cs typeface="+mn-cs"/>
         </a:defRPr>
       </a:lvl5pPr>
-      <a:lvl6pPr marL="2514600" indent="-228600" algn="l" defTabSz="914400" rtl="0" eaLnBrk="1" latinLnBrk="0" hangingPunct="1">
+      <a:lvl6pPr marL="1664208" indent="-182880" algn="l" defTabSz="914400" rtl="0" eaLnBrk="1" latinLnBrk="0" hangingPunct="1">
         <a:spcBef>
           <a:spcPct val="20000"/>
         </a:spcBef>
-        <a:buFont typeface="Arial" pitchFamily="34" charset="0"/>
-        <a:buChar char="•"/>
-        <a:defRPr sz="2000" kern="1200">
+        <a:spcAft>
+          <a:spcPts val="300"/>
+        </a:spcAft>
+        <a:buClr>
+          <a:schemeClr val="accent6">
+            <a:lumMod val="75000"/>
+          </a:schemeClr>
+        </a:buClr>
+        <a:buSzPct val="130000"/>
+        <a:buFont typeface="Georgia" pitchFamily="18" charset="0"/>
+        <a:buChar char="*"/>
+        <a:defRPr sz="1400" kern="1200">
           <a:solidFill>
-            <a:schemeClr val="tx1"/>
+            <a:schemeClr val="tx1">
+              <a:lumMod val="75000"/>
+              <a:lumOff val="25000"/>
+            </a:schemeClr>
           </a:solidFill>
           <a:latin typeface="+mn-lt"/>
           <a:ea typeface="+mn-ea"/>
           <a:cs typeface="+mn-cs"/>
         </a:defRPr>
       </a:lvl6pPr>
-      <a:lvl7pPr marL="2971800" indent="-228600" algn="l" defTabSz="914400" rtl="0" eaLnBrk="1" latinLnBrk="0" hangingPunct="1">
+      <a:lvl7pPr marL="1965960" indent="-182880" algn="l" defTabSz="914400" rtl="0" eaLnBrk="1" latinLnBrk="0" hangingPunct="1">
         <a:spcBef>
           <a:spcPct val="20000"/>
         </a:spcBef>
-        <a:buFont typeface="Arial" pitchFamily="34" charset="0"/>
-        <a:buChar char="•"/>
-        <a:defRPr sz="2000" kern="1200">
+        <a:spcAft>
+          <a:spcPts val="300"/>
+        </a:spcAft>
+        <a:buClr>
+          <a:schemeClr val="accent6">
+            <a:lumMod val="75000"/>
+          </a:schemeClr>
+        </a:buClr>
+        <a:buSzPct val="130000"/>
+        <a:buFont typeface="Georgia" pitchFamily="18" charset="0"/>
+        <a:buChar char="*"/>
+        <a:defRPr sz="1400" kern="1200">
           <a:solidFill>
-            <a:schemeClr val="tx1"/>
+            <a:schemeClr val="tx1">
+              <a:lumMod val="75000"/>
+              <a:lumOff val="25000"/>
+            </a:schemeClr>
           </a:solidFill>
           <a:latin typeface="+mn-lt"/>
           <a:ea typeface="+mn-ea"/>
           <a:cs typeface="+mn-cs"/>
         </a:defRPr>
       </a:lvl7pPr>
-      <a:lvl8pPr marL="3429000" indent="-228600" algn="l" defTabSz="914400" rtl="0" eaLnBrk="1" latinLnBrk="0" hangingPunct="1">
+      <a:lvl8pPr marL="2286000" indent="-182880" algn="l" defTabSz="914400" rtl="0" eaLnBrk="1" latinLnBrk="0" hangingPunct="1">
         <a:spcBef>
           <a:spcPct val="20000"/>
         </a:spcBef>
-        <a:buFont typeface="Arial" pitchFamily="34" charset="0"/>
-        <a:buChar char="•"/>
-        <a:defRPr sz="2000" kern="1200">
+        <a:spcAft>
+          <a:spcPts val="300"/>
+        </a:spcAft>
+        <a:buClr>
+          <a:schemeClr val="accent6">
+            <a:lumMod val="75000"/>
+          </a:schemeClr>
+        </a:buClr>
+        <a:buSzPct val="130000"/>
+        <a:buFont typeface="Georgia" pitchFamily="18" charset="0"/>
+        <a:buChar char="*"/>
+        <a:defRPr sz="1400" kern="1200">
           <a:solidFill>
-            <a:schemeClr val="tx1"/>
+            <a:schemeClr val="tx1">
+              <a:lumMod val="75000"/>
+              <a:lumOff val="25000"/>
+            </a:schemeClr>
           </a:solidFill>
           <a:latin typeface="+mn-lt"/>
           <a:ea typeface="+mn-ea"/>
           <a:cs typeface="+mn-cs"/>
         </a:defRPr>
       </a:lvl8pPr>
-      <a:lvl9pPr marL="3886200" indent="-228600" algn="l" defTabSz="914400" rtl="0" eaLnBrk="1" latinLnBrk="0" hangingPunct="1">
+      <a:lvl9pPr marL="2587752" indent="-182880" algn="l" defTabSz="914400" rtl="0" eaLnBrk="1" latinLnBrk="0" hangingPunct="1">
         <a:spcBef>
           <a:spcPct val="20000"/>
         </a:spcBef>
-        <a:buFont typeface="Arial" pitchFamily="34" charset="0"/>
-        <a:buChar char="•"/>
-        <a:defRPr sz="2000" kern="1200">
+        <a:spcAft>
+          <a:spcPts val="300"/>
+        </a:spcAft>
+        <a:buClr>
+          <a:schemeClr val="accent6">
+            <a:lumMod val="75000"/>
+          </a:schemeClr>
+        </a:buClr>
+        <a:buSzPct val="130000"/>
+        <a:buFont typeface="Georgia" pitchFamily="18" charset="0"/>
+        <a:buChar char="*"/>
+        <a:defRPr sz="1400" kern="1200">
           <a:solidFill>
-            <a:schemeClr val="tx1"/>
+            <a:schemeClr val="tx1">
+              <a:lumMod val="75000"/>
+              <a:lumOff val="25000"/>
+            </a:schemeClr>
           </a:solidFill>
           <a:latin typeface="+mn-lt"/>
           <a:ea typeface="+mn-ea"/>
@@ -7969,11 +9337,11 @@
   <p:clrMapOvr>
     <a:masterClrMapping/>
   </p:clrMapOvr>
-  <mc:AlternateContent xmlns:mc="http://schemas.openxmlformats.org/markup-compatibility/2006" xmlns:p14="http://schemas.microsoft.com/office/powerpoint/2010/main">
-    <mc:Choice Requires="p14">
-      <p:transition p14:dur="0"/>
+  <mc:AlternateContent xmlns:mc="http://schemas.openxmlformats.org/markup-compatibility/2006">
+    <mc:Choice xmlns:p14="http://schemas.microsoft.com/office/powerpoint/2010/main" Requires="p14">
+      <p:transition p14:dur="10"/>
     </mc:Choice>
-    <mc:Fallback xmlns="">
+    <mc:Fallback>
       <p:transition/>
     </mc:Fallback>
   </mc:AlternateContent>
@@ -8020,17 +9388,17 @@
           </a:prstGeom>
         </p:spPr>
         <p:style>
-          <a:lnRef idx="0">
-            <a:schemeClr val="accent3"/>
+          <a:lnRef idx="1">
+            <a:schemeClr val="accent2"/>
           </a:lnRef>
-          <a:fillRef idx="3">
-            <a:schemeClr val="accent3"/>
+          <a:fillRef idx="2">
+            <a:schemeClr val="accent2"/>
           </a:fillRef>
-          <a:effectRef idx="3">
-            <a:schemeClr val="accent3"/>
+          <a:effectRef idx="1">
+            <a:schemeClr val="accent2"/>
           </a:effectRef>
           <a:fontRef idx="minor">
-            <a:schemeClr val="lt1"/>
+            <a:schemeClr val="dk1"/>
           </a:fontRef>
         </p:style>
         <p:txBody>
@@ -8606,17 +9974,17 @@
           </a:prstGeom>
         </p:spPr>
         <p:style>
-          <a:lnRef idx="0">
-            <a:schemeClr val="accent3"/>
+          <a:lnRef idx="1">
+            <a:schemeClr val="accent2"/>
           </a:lnRef>
-          <a:fillRef idx="3">
-            <a:schemeClr val="accent3"/>
+          <a:fillRef idx="2">
+            <a:schemeClr val="accent2"/>
           </a:fillRef>
-          <a:effectRef idx="3">
-            <a:schemeClr val="accent3"/>
+          <a:effectRef idx="1">
+            <a:schemeClr val="accent2"/>
           </a:effectRef>
           <a:fontRef idx="minor">
-            <a:schemeClr val="lt1"/>
+            <a:schemeClr val="dk1"/>
           </a:fontRef>
         </p:style>
         <p:txBody>
@@ -8935,6 +10303,325 @@
           <a:chExt cx="0" cy="0"/>
         </a:xfrm>
       </p:grpSpPr>
+      <p:sp>
+        <p:nvSpPr>
+          <p:cNvPr id="2" name="Rounded Rectangle 1"/>
+          <p:cNvSpPr/>
+          <p:nvPr/>
+        </p:nvSpPr>
+        <p:spPr>
+          <a:xfrm>
+            <a:off x="228599" y="304800"/>
+            <a:ext cx="7162801" cy="838200"/>
+          </a:xfrm>
+          <a:prstGeom prst="roundRect">
+            <a:avLst/>
+          </a:prstGeom>
+        </p:spPr>
+        <p:style>
+          <a:lnRef idx="1">
+            <a:schemeClr val="accent2"/>
+          </a:lnRef>
+          <a:fillRef idx="2">
+            <a:schemeClr val="accent2"/>
+          </a:fillRef>
+          <a:effectRef idx="1">
+            <a:schemeClr val="accent2"/>
+          </a:effectRef>
+          <a:fontRef idx="minor">
+            <a:schemeClr val="dk1"/>
+          </a:fontRef>
+        </p:style>
+        <p:txBody>
+          <a:bodyPr rtlCol="0" anchor="ctr">
+            <a:scene3d>
+              <a:camera prst="orthographicFront"/>
+              <a:lightRig rig="glow" dir="tl">
+                <a:rot lat="0" lon="0" rev="5400000"/>
+              </a:lightRig>
+            </a:scene3d>
+            <a:sp3d contourW="12700">
+              <a:bevelT w="25400" h="25400"/>
+              <a:contourClr>
+                <a:schemeClr val="accent6">
+                  <a:shade val="73000"/>
+                </a:schemeClr>
+              </a:contourClr>
+            </a:sp3d>
+          </a:bodyPr>
+          <a:lstStyle/>
+          <a:p>
+            <a:r>
+              <a:rPr lang="en-US" sz="5400" b="1" dirty="0" smtClean="0">
+                <a:ln w="11430"/>
+                <a:gradFill>
+                  <a:gsLst>
+                    <a:gs pos="0">
+                      <a:schemeClr val="accent6">
+                        <a:tint val="90000"/>
+                        <a:satMod val="120000"/>
+                      </a:schemeClr>
+                    </a:gs>
+                    <a:gs pos="25000">
+                      <a:schemeClr val="accent6">
+                        <a:tint val="93000"/>
+                        <a:satMod val="120000"/>
+                      </a:schemeClr>
+                    </a:gs>
+                    <a:gs pos="50000">
+                      <a:schemeClr val="accent6">
+                        <a:shade val="89000"/>
+                        <a:satMod val="110000"/>
+                      </a:schemeClr>
+                    </a:gs>
+                    <a:gs pos="75000">
+                      <a:schemeClr val="accent6">
+                        <a:tint val="93000"/>
+                        <a:satMod val="120000"/>
+                      </a:schemeClr>
+                    </a:gs>
+                    <a:gs pos="100000">
+                      <a:schemeClr val="accent6">
+                        <a:tint val="90000"/>
+                        <a:satMod val="120000"/>
+                      </a:schemeClr>
+                    </a:gs>
+                  </a:gsLst>
+                  <a:lin ang="5400000"/>
+                </a:gradFill>
+                <a:effectLst>
+                  <a:outerShdw blurRad="80000" dist="40000" dir="5040000" algn="tl">
+                    <a:srgbClr val="000000">
+                      <a:alpha val="30000"/>
+                    </a:srgbClr>
+                  </a:outerShdw>
+                </a:effectLst>
+              </a:rPr>
+              <a:t>Complete ERD</a:t>
+            </a:r>
+            <a:endParaRPr lang="en-US" sz="5400" b="1" dirty="0">
+              <a:ln w="11430"/>
+              <a:gradFill>
+                <a:gsLst>
+                  <a:gs pos="0">
+                    <a:schemeClr val="accent6">
+                      <a:tint val="90000"/>
+                      <a:satMod val="120000"/>
+                    </a:schemeClr>
+                  </a:gs>
+                  <a:gs pos="25000">
+                    <a:schemeClr val="accent6">
+                      <a:tint val="93000"/>
+                      <a:satMod val="120000"/>
+                    </a:schemeClr>
+                  </a:gs>
+                  <a:gs pos="50000">
+                    <a:schemeClr val="accent6">
+                      <a:shade val="89000"/>
+                      <a:satMod val="110000"/>
+                    </a:schemeClr>
+                  </a:gs>
+                  <a:gs pos="75000">
+                    <a:schemeClr val="accent6">
+                      <a:tint val="93000"/>
+                      <a:satMod val="120000"/>
+                    </a:schemeClr>
+                  </a:gs>
+                  <a:gs pos="100000">
+                    <a:schemeClr val="accent6">
+                      <a:tint val="90000"/>
+                      <a:satMod val="120000"/>
+                    </a:schemeClr>
+                  </a:gs>
+                </a:gsLst>
+                <a:lin ang="5400000"/>
+              </a:gradFill>
+              <a:effectLst>
+                <a:outerShdw blurRad="80000" dist="40000" dir="5040000" algn="tl">
+                  <a:srgbClr val="000000">
+                    <a:alpha val="30000"/>
+                  </a:srgbClr>
+                </a:outerShdw>
+              </a:effectLst>
+            </a:endParaRPr>
+          </a:p>
+        </p:txBody>
+      </p:sp>
+      <p:pic>
+        <p:nvPicPr>
+          <p:cNvPr id="3" name="Picture 2" descr="D:\Rakinsfiles\rakin's L-3 T-1\Software\LAB_ISD\Photos\Supreme Court of Bangladesh.jpg"/>
+          <p:cNvPicPr>
+            <a:picLocks noChangeAspect="1" noChangeArrowheads="1"/>
+          </p:cNvPicPr>
+          <p:nvPr/>
+        </p:nvPicPr>
+        <p:blipFill>
+          <a:blip r:embed="rId2" cstate="print">
+            <a:extLst>
+              <a:ext uri="{28A0092B-C50C-407E-A947-70E740481C1C}">
+                <a14:useLocalDpi xmlns:a14="http://schemas.microsoft.com/office/drawing/2010/main" val="0"/>
+              </a:ext>
+            </a:extLst>
+          </a:blip>
+          <a:srcRect/>
+          <a:stretch>
+            <a:fillRect/>
+          </a:stretch>
+        </p:blipFill>
+        <p:spPr bwMode="auto">
+          <a:xfrm>
+            <a:off x="7391400" y="212491"/>
+            <a:ext cx="1461167" cy="1022817"/>
+          </a:xfrm>
+          <a:prstGeom prst="ellipse">
+            <a:avLst/>
+          </a:prstGeom>
+          <a:ln>
+            <a:noFill/>
+          </a:ln>
+          <a:effectLst>
+            <a:softEdge rad="112500"/>
+          </a:effectLst>
+          <a:extLst>
+            <a:ext uri="{909E8E84-426E-40DD-AFC4-6F175D3DCCD1}">
+              <a14:hiddenFill xmlns:a14="http://schemas.microsoft.com/office/drawing/2010/main">
+                <a:solidFill>
+                  <a:srgbClr val="FFFFFF"/>
+                </a:solidFill>
+              </a14:hiddenFill>
+            </a:ext>
+          </a:extLst>
+        </p:spPr>
+      </p:pic>
+      <p:sp>
+        <p:nvSpPr>
+          <p:cNvPr id="4" name="Slide Number Placeholder 3"/>
+          <p:cNvSpPr>
+            <a:spLocks noGrp="1"/>
+          </p:cNvSpPr>
+          <p:nvPr>
+            <p:ph type="sldNum" sz="quarter" idx="12"/>
+          </p:nvPr>
+        </p:nvSpPr>
+        <p:spPr>
+          <a:xfrm>
+            <a:off x="8305800" y="990600"/>
+            <a:ext cx="709832" cy="495299"/>
+          </a:xfrm>
+        </p:spPr>
+        <p:txBody>
+          <a:bodyPr>
+            <a:scene3d>
+              <a:camera prst="orthographicFront">
+                <a:rot lat="0" lon="0" rev="0"/>
+              </a:camera>
+              <a:lightRig rig="contrasting" dir="t">
+                <a:rot lat="0" lon="0" rev="4500000"/>
+              </a:lightRig>
+            </a:scene3d>
+            <a:sp3d contourW="6350" prstMaterial="metal">
+              <a:bevelT w="127000" h="31750" prst="relaxedInset"/>
+              <a:contourClr>
+                <a:schemeClr val="accent1">
+                  <a:shade val="75000"/>
+                </a:schemeClr>
+              </a:contourClr>
+            </a:sp3d>
+          </a:bodyPr>
+          <a:lstStyle/>
+          <a:p>
+            <a:fld id="{D787AFA1-61CC-4523-8BB5-29B4479E0D14}" type="slidenum">
+              <a:rPr lang="en-US" sz="3600" cap="all" smtClean="0">
+                <a:ln w="0"/>
+                <a:gradFill flip="none">
+                  <a:gsLst>
+                    <a:gs pos="0">
+                      <a:schemeClr val="accent1">
+                        <a:tint val="75000"/>
+                        <a:shade val="75000"/>
+                        <a:satMod val="170000"/>
+                      </a:schemeClr>
+                    </a:gs>
+                    <a:gs pos="49000">
+                      <a:schemeClr val="accent1">
+                        <a:tint val="88000"/>
+                        <a:shade val="65000"/>
+                        <a:satMod val="172000"/>
+                      </a:schemeClr>
+                    </a:gs>
+                    <a:gs pos="50000">
+                      <a:schemeClr val="accent1">
+                        <a:shade val="65000"/>
+                        <a:satMod val="130000"/>
+                      </a:schemeClr>
+                    </a:gs>
+                    <a:gs pos="92000">
+                      <a:schemeClr val="accent1">
+                        <a:shade val="50000"/>
+                        <a:satMod val="120000"/>
+                      </a:schemeClr>
+                    </a:gs>
+                    <a:gs pos="100000">
+                      <a:schemeClr val="accent1">
+                        <a:shade val="48000"/>
+                        <a:satMod val="120000"/>
+                      </a:schemeClr>
+                    </a:gs>
+                  </a:gsLst>
+                  <a:lin ang="5400000"/>
+                </a:gradFill>
+                <a:effectLst>
+                  <a:reflection blurRad="12700" stA="50000" endPos="50000" dist="5000" dir="5400000" sy="-100000" rotWithShape="0"/>
+                </a:effectLst>
+              </a:rPr>
+              <a:t>4</a:t>
+            </a:fld>
+            <a:endParaRPr lang="en-US" sz="3600" cap="all" dirty="0">
+              <a:ln w="0"/>
+              <a:gradFill flip="none">
+                <a:gsLst>
+                  <a:gs pos="0">
+                    <a:schemeClr val="accent1">
+                      <a:tint val="75000"/>
+                      <a:shade val="75000"/>
+                      <a:satMod val="170000"/>
+                    </a:schemeClr>
+                  </a:gs>
+                  <a:gs pos="49000">
+                    <a:schemeClr val="accent1">
+                      <a:tint val="88000"/>
+                      <a:shade val="65000"/>
+                      <a:satMod val="172000"/>
+                    </a:schemeClr>
+                  </a:gs>
+                  <a:gs pos="50000">
+                    <a:schemeClr val="accent1">
+                      <a:shade val="65000"/>
+                      <a:satMod val="130000"/>
+                    </a:schemeClr>
+                  </a:gs>
+                  <a:gs pos="92000">
+                    <a:schemeClr val="accent1">
+                      <a:shade val="50000"/>
+                      <a:satMod val="120000"/>
+                    </a:schemeClr>
+                  </a:gs>
+                  <a:gs pos="100000">
+                    <a:schemeClr val="accent1">
+                      <a:shade val="48000"/>
+                      <a:satMod val="120000"/>
+                    </a:schemeClr>
+                  </a:gs>
+                </a:gsLst>
+                <a:lin ang="5400000"/>
+              </a:gradFill>
+              <a:effectLst>
+                <a:reflection blurRad="12700" stA="50000" endPos="50000" dist="5000" dir="5400000" sy="-100000" rotWithShape="0"/>
+              </a:effectLst>
+            </a:endParaRPr>
+          </a:p>
+        </p:txBody>
+      </p:sp>
     </p:spTree>
     <p:extLst>
       <p:ext uri="{BB962C8B-B14F-4D97-AF65-F5344CB8AC3E}">
@@ -8945,13 +10632,20 @@
   <p:clrMapOvr>
     <a:masterClrMapping/>
   </p:clrMapOvr>
+  <p:timing>
+    <p:tnLst>
+      <p:par>
+        <p:cTn id="1" dur="indefinite" restart="never" nodeType="tmRoot"/>
+      </p:par>
+    </p:tnLst>
+  </p:timing>
 </p:sld>
 </file>
 
 <file path=ppt/theme/theme1.xml><?xml version="1.0" encoding="utf-8"?>
-<a:theme xmlns:a="http://schemas.openxmlformats.org/drawingml/2006/main" name="Office Theme">
+<a:theme xmlns:a="http://schemas.openxmlformats.org/drawingml/2006/main" name="Slipstream">
   <a:themeElements>
-    <a:clrScheme name="Office">
+    <a:clrScheme name="Slipstream">
       <a:dk1>
         <a:sysClr val="windowText" lastClr="000000"/>
       </a:dk1>
@@ -8959,52 +10653,52 @@
         <a:sysClr val="window" lastClr="FFFFFF"/>
       </a:lt1>
       <a:dk2>
-        <a:srgbClr val="1F497D"/>
+        <a:srgbClr val="212745"/>
       </a:dk2>
       <a:lt2>
-        <a:srgbClr val="EEECE1"/>
+        <a:srgbClr val="B4DCFA"/>
       </a:lt2>
       <a:accent1>
-        <a:srgbClr val="4F81BD"/>
+        <a:srgbClr val="4E67C8"/>
       </a:accent1>
       <a:accent2>
-        <a:srgbClr val="C0504D"/>
+        <a:srgbClr val="5ECCF3"/>
       </a:accent2>
       <a:accent3>
-        <a:srgbClr val="9BBB59"/>
+        <a:srgbClr val="A7EA52"/>
       </a:accent3>
       <a:accent4>
-        <a:srgbClr val="8064A2"/>
+        <a:srgbClr val="5DCEAF"/>
       </a:accent4>
       <a:accent5>
-        <a:srgbClr val="4BACC6"/>
+        <a:srgbClr val="FF8021"/>
       </a:accent5>
       <a:accent6>
-        <a:srgbClr val="F79646"/>
+        <a:srgbClr val="F14124"/>
       </a:accent6>
       <a:hlink>
-        <a:srgbClr val="0000FF"/>
+        <a:srgbClr val="56C7AA"/>
       </a:hlink>
       <a:folHlink>
-        <a:srgbClr val="800080"/>
+        <a:srgbClr val="59A8D1"/>
       </a:folHlink>
     </a:clrScheme>
-    <a:fontScheme name="Office">
+    <a:fontScheme name="Slipstream">
       <a:majorFont>
-        <a:latin typeface="Calibri"/>
+        <a:latin typeface="Trebuchet MS"/>
         <a:ea typeface=""/>
         <a:cs typeface=""/>
-        <a:font script="Jpan" typeface="ＭＳ Ｐゴシック"/>
-        <a:font script="Hang" typeface="맑은 고딕"/>
-        <a:font script="Hans" typeface="宋体"/>
-        <a:font script="Hant" typeface="新細明體"/>
-        <a:font script="Arab" typeface="Times New Roman"/>
-        <a:font script="Hebr" typeface="Times New Roman"/>
-        <a:font script="Thai" typeface="Angsana New"/>
+        <a:font script="Jpan" typeface="HGｺﾞｼｯｸM"/>
+        <a:font script="Hang" typeface="HY그래픽B"/>
+        <a:font script="Hans" typeface="方正姚体"/>
+        <a:font script="Hant" typeface="微軟正黑體"/>
+        <a:font script="Arab" typeface="Tahoma"/>
+        <a:font script="Hebr" typeface="Gisha"/>
+        <a:font script="Thai" typeface="IrisUPC"/>
         <a:font script="Ethi" typeface="Nyala"/>
         <a:font script="Beng" typeface="Vrinda"/>
         <a:font script="Gujr" typeface="Shruti"/>
-        <a:font script="Khmr" typeface="MoolBoran"/>
+        <a:font script="Khmr" typeface="DaunPenh"/>
         <a:font script="Knda" typeface="Tunga"/>
         <a:font script="Guru" typeface="Raavi"/>
         <a:font script="Cans" typeface="Euphemia"/>
@@ -9021,20 +10715,21 @@
         <a:font script="Laoo" typeface="DokChampa"/>
         <a:font script="Sinh" typeface="Iskoola Pota"/>
         <a:font script="Mong" typeface="Mongolian Baiti"/>
-        <a:font script="Viet" typeface="Times New Roman"/>
+        <a:font script="Viet" typeface="Tahoma"/>
         <a:font script="Uigh" typeface="Microsoft Uighur"/>
+        <a:font script="Geor" typeface="Sylfaen"/>
       </a:majorFont>
       <a:minorFont>
-        <a:latin typeface="Calibri"/>
+        <a:latin typeface="Trebuchet MS"/>
         <a:ea typeface=""/>
         <a:cs typeface=""/>
-        <a:font script="Jpan" typeface="ＭＳ Ｐゴシック"/>
-        <a:font script="Hang" typeface="맑은 고딕"/>
-        <a:font script="Hans" typeface="宋体"/>
-        <a:font script="Hant" typeface="新細明體"/>
-        <a:font script="Arab" typeface="Arial"/>
-        <a:font script="Hebr" typeface="Arial"/>
-        <a:font script="Thai" typeface="Cordia New"/>
+        <a:font script="Jpan" typeface="HGｺﾞｼｯｸM"/>
+        <a:font script="Hang" typeface="HY그래픽M"/>
+        <a:font script="Hans" typeface="方正姚体"/>
+        <a:font script="Hant" typeface="微軟正黑體"/>
+        <a:font script="Arab" typeface="Tahoma"/>
+        <a:font script="Hebr" typeface="Gisha"/>
+        <a:font script="Thai" typeface="IrisUPC"/>
         <a:font script="Ethi" typeface="Nyala"/>
         <a:font script="Beng" typeface="Vrinda"/>
         <a:font script="Gujr" typeface="Shruti"/>
@@ -9057,66 +10752,64 @@
         <a:font script="Mong" typeface="Mongolian Baiti"/>
         <a:font script="Viet" typeface="Arial"/>
         <a:font script="Uigh" typeface="Microsoft Uighur"/>
+        <a:font script="Geor" typeface="Sylfaen"/>
       </a:minorFont>
     </a:fontScheme>
-    <a:fmtScheme name="Office">
+    <a:fmtScheme name="Slipstream">
       <a:fillStyleLst>
         <a:solidFill>
           <a:schemeClr val="phClr"/>
         </a:solidFill>
         <a:gradFill rotWithShape="1">
           <a:gsLst>
-            <a:gs pos="0">
+            <a:gs pos="28000">
               <a:schemeClr val="phClr">
-                <a:tint val="50000"/>
-                <a:satMod val="300000"/>
-              </a:schemeClr>
-            </a:gs>
-            <a:gs pos="35000">
-              <a:schemeClr val="phClr">
-                <a:tint val="37000"/>
-                <a:satMod val="300000"/>
+                <a:tint val="18000"/>
+                <a:satMod val="120000"/>
+                <a:lumMod val="88000"/>
               </a:schemeClr>
             </a:gs>
             <a:gs pos="100000">
               <a:schemeClr val="phClr">
-                <a:tint val="15000"/>
-                <a:satMod val="350000"/>
+                <a:tint val="40000"/>
+                <a:satMod val="100000"/>
+                <a:lumMod val="78000"/>
               </a:schemeClr>
             </a:gs>
           </a:gsLst>
-          <a:lin ang="16200000" scaled="1"/>
+          <a:lin ang="5400000" scaled="0"/>
         </a:gradFill>
         <a:gradFill rotWithShape="1">
           <a:gsLst>
             <a:gs pos="0">
               <a:schemeClr val="phClr">
-                <a:shade val="51000"/>
-                <a:satMod val="130000"/>
-              </a:schemeClr>
-            </a:gs>
-            <a:gs pos="80000">
-              <a:schemeClr val="phClr">
-                <a:shade val="93000"/>
-                <a:satMod val="130000"/>
+                <a:lumMod val="95000"/>
               </a:schemeClr>
             </a:gs>
             <a:gs pos="100000">
               <a:schemeClr val="phClr">
-                <a:shade val="94000"/>
-                <a:satMod val="135000"/>
+                <a:shade val="82000"/>
+                <a:satMod val="125000"/>
+                <a:lumMod val="74000"/>
               </a:schemeClr>
             </a:gs>
           </a:gsLst>
-          <a:lin ang="16200000" scaled="0"/>
+          <a:lin ang="5400000" scaled="0"/>
         </a:gradFill>
       </a:fillStyleLst>
       <a:lnStyleLst>
         <a:ln w="9525" cap="flat" cmpd="sng" algn="ctr">
           <a:solidFill>
+            <a:schemeClr val="phClr"/>
+          </a:solidFill>
+          <a:prstDash val="solid"/>
+        </a:ln>
+        <a:ln w="15875" cap="flat" cmpd="sng" algn="ctr">
+          <a:solidFill>
             <a:schemeClr val="phClr">
-              <a:shade val="95000"/>
-              <a:satMod val="105000"/>
+              <a:shade val="75000"/>
+              <a:satMod val="125000"/>
+              <a:lumMod val="75000"/>
             </a:schemeClr>
           </a:solidFill>
           <a:prstDash val="solid"/>
@@ -9127,37 +10820,22 @@
           </a:solidFill>
           <a:prstDash val="solid"/>
         </a:ln>
-        <a:ln w="38100" cap="flat" cmpd="sng" algn="ctr">
-          <a:solidFill>
-            <a:schemeClr val="phClr"/>
-          </a:solidFill>
-          <a:prstDash val="solid"/>
-        </a:ln>
       </a:lnStyleLst>
       <a:effectStyleLst>
         <a:effectStyle>
           <a:effectLst>
-            <a:outerShdw blurRad="40000" dist="20000" dir="5400000" rotWithShape="0">
+            <a:outerShdw blurRad="63500" dist="50800" dir="5400000" sx="98000" sy="98000" rotWithShape="0">
               <a:srgbClr val="000000">
-                <a:alpha val="38000"/>
+                <a:alpha val="20000"/>
               </a:srgbClr>
             </a:outerShdw>
           </a:effectLst>
         </a:effectStyle>
         <a:effectStyle>
           <a:effectLst>
-            <a:outerShdw blurRad="40000" dist="23000" dir="5400000" rotWithShape="0">
+            <a:outerShdw blurRad="40005" dist="22984" dir="5400000" rotWithShape="0">
               <a:srgbClr val="000000">
-                <a:alpha val="35000"/>
-              </a:srgbClr>
-            </a:outerShdw>
-          </a:effectLst>
-        </a:effectStyle>
-        <a:effectStyle>
-          <a:effectLst>
-            <a:outerShdw blurRad="40000" dist="23000" dir="5400000" rotWithShape="0">
-              <a:srgbClr val="000000">
-                <a:alpha val="35000"/>
+                <a:alpha val="45000"/>
               </a:srgbClr>
             </a:outerShdw>
           </a:effectLst>
@@ -9165,12 +10843,30 @@
             <a:camera prst="orthographicFront">
               <a:rot lat="0" lon="0" rev="0"/>
             </a:camera>
-            <a:lightRig rig="threePt" dir="t">
-              <a:rot lat="0" lon="0" rev="1200000"/>
-            </a:lightRig>
+            <a:lightRig rig="balanced" dir="tr"/>
           </a:scene3d>
-          <a:sp3d>
-            <a:bevelT w="63500" h="25400"/>
+          <a:sp3d prstMaterial="matte">
+            <a:bevelT w="19050" h="38100"/>
+          </a:sp3d>
+        </a:effectStyle>
+        <a:effectStyle>
+          <a:effectLst>
+            <a:reflection blurRad="38100" stA="26000" endPos="23000" dist="25400" dir="5400000" sy="-100000" rotWithShape="0"/>
+          </a:effectLst>
+          <a:scene3d>
+            <a:camera prst="orthographicFront">
+              <a:rot lat="0" lon="0" rev="0"/>
+            </a:camera>
+            <a:lightRig rig="balanced" dir="tr"/>
+          </a:scene3d>
+          <a:sp3d contourW="14605" prstMaterial="plastic">
+            <a:bevelT w="50800"/>
+            <a:contourClr>
+              <a:schemeClr val="phClr">
+                <a:shade val="30000"/>
+                <a:satMod val="120000"/>
+              </a:schemeClr>
+            </a:contourClr>
           </a:sp3d>
         </a:effectStyle>
       </a:effectStyleLst>
@@ -9182,45 +10878,62 @@
           <a:gsLst>
             <a:gs pos="0">
               <a:schemeClr val="phClr">
-                <a:tint val="40000"/>
-                <a:satMod val="350000"/>
+                <a:tint val="98000"/>
+                <a:shade val="90000"/>
+                <a:satMod val="160000"/>
+                <a:lumMod val="100000"/>
               </a:schemeClr>
             </a:gs>
-            <a:gs pos="40000">
+            <a:gs pos="60000">
               <a:schemeClr val="phClr">
-                <a:tint val="45000"/>
-                <a:shade val="99000"/>
-                <a:satMod val="350000"/>
+                <a:tint val="95000"/>
+                <a:shade val="100000"/>
+                <a:satMod val="130000"/>
+                <a:lumMod val="130000"/>
               </a:schemeClr>
             </a:gs>
             <a:gs pos="100000">
               <a:schemeClr val="phClr">
-                <a:shade val="20000"/>
-                <a:satMod val="255000"/>
+                <a:tint val="97000"/>
+                <a:shade val="100000"/>
+                <a:hueMod val="100000"/>
+                <a:satMod val="140000"/>
+                <a:lumMod val="80000"/>
               </a:schemeClr>
             </a:gs>
           </a:gsLst>
           <a:path path="circle">
-            <a:fillToRect l="50000" t="-80000" r="50000" b="180000"/>
+            <a:fillToRect l="20000" t="10000" r="20000" b="60000"/>
           </a:path>
         </a:gradFill>
         <a:gradFill rotWithShape="1">
           <a:gsLst>
             <a:gs pos="0">
               <a:schemeClr val="phClr">
-                <a:tint val="80000"/>
-                <a:satMod val="300000"/>
+                <a:tint val="94000"/>
+                <a:satMod val="160000"/>
+                <a:lumMod val="160000"/>
+              </a:schemeClr>
+            </a:gs>
+            <a:gs pos="42000">
+              <a:schemeClr val="phClr">
+                <a:tint val="94000"/>
+                <a:shade val="94000"/>
+                <a:satMod val="160000"/>
+                <a:lumMod val="130000"/>
               </a:schemeClr>
             </a:gs>
             <a:gs pos="100000">
               <a:schemeClr val="phClr">
-                <a:shade val="30000"/>
-                <a:satMod val="200000"/>
+                <a:tint val="97000"/>
+                <a:shade val="94000"/>
+                <a:satMod val="180000"/>
+                <a:lumMod val="84000"/>
               </a:schemeClr>
             </a:gs>
           </a:gsLst>
           <a:path path="circle">
-            <a:fillToRect l="50000" t="50000" r="50000" b="50000"/>
+            <a:fillToRect l="24000" t="44000" r="24000" b="12000"/>
           </a:path>
         </a:gradFill>
       </a:bgFillStyleLst>

</xml_diff>